<commit_message>
Update ROS topic; Add ROS service base slide
</commit_message>
<xml_diff>
--- a/DiRa_Digital_Race_Software/Reference/ROS/Working with ROS topic.pptx
+++ b/DiRa_Digital_Race_Software/Reference/ROS/Working with ROS topic.pptx
@@ -7,17 +7,19 @@
   <p:sldIdLst>
     <p:sldId id="256" r:id="rId2"/>
     <p:sldId id="257" r:id="rId3"/>
-    <p:sldId id="258" r:id="rId4"/>
-    <p:sldId id="259" r:id="rId5"/>
-    <p:sldId id="266" r:id="rId6"/>
-    <p:sldId id="267" r:id="rId7"/>
-    <p:sldId id="268" r:id="rId8"/>
-    <p:sldId id="261" r:id="rId9"/>
-    <p:sldId id="263" r:id="rId10"/>
-    <p:sldId id="264" r:id="rId11"/>
-    <p:sldId id="262" r:id="rId12"/>
-    <p:sldId id="260" r:id="rId13"/>
-    <p:sldId id="265" r:id="rId14"/>
+    <p:sldId id="269" r:id="rId4"/>
+    <p:sldId id="258" r:id="rId5"/>
+    <p:sldId id="259" r:id="rId6"/>
+    <p:sldId id="266" r:id="rId7"/>
+    <p:sldId id="267" r:id="rId8"/>
+    <p:sldId id="268" r:id="rId9"/>
+    <p:sldId id="261" r:id="rId10"/>
+    <p:sldId id="270" r:id="rId11"/>
+    <p:sldId id="263" r:id="rId12"/>
+    <p:sldId id="264" r:id="rId13"/>
+    <p:sldId id="262" r:id="rId14"/>
+    <p:sldId id="260" r:id="rId15"/>
+    <p:sldId id="265" r:id="rId16"/>
   </p:sldIdLst>
   <p:sldSz cx="12192000" cy="6858000"/>
   <p:notesSz cx="6858000" cy="9144000"/>
@@ -3303,6 +3305,161 @@
 <file path=ppt/slides/slide10.xml><?xml version="1.0" encoding="utf-8"?>
 <p:sld xmlns:a="http://schemas.openxmlformats.org/drawingml/2006/main" xmlns:r="http://schemas.openxmlformats.org/officeDocument/2006/relationships" xmlns:p="http://schemas.openxmlformats.org/presentationml/2006/main">
   <p:cSld>
+    <p:spTree>
+      <p:nvGrpSpPr>
+        <p:cNvPr id="1" name=""/>
+        <p:cNvGrpSpPr/>
+        <p:nvPr/>
+      </p:nvGrpSpPr>
+      <p:grpSpPr>
+        <a:xfrm>
+          <a:off x="0" y="0"/>
+          <a:ext cx="0" cy="0"/>
+          <a:chOff x="0" y="0"/>
+          <a:chExt cx="0" cy="0"/>
+        </a:xfrm>
+      </p:grpSpPr>
+      <p:sp>
+        <p:nvSpPr>
+          <p:cNvPr id="2" name="Title 1">
+            <a:extLst>
+              <a:ext uri="{FF2B5EF4-FFF2-40B4-BE49-F238E27FC236}">
+                <a16:creationId xmlns:a16="http://schemas.microsoft.com/office/drawing/2014/main" id="{990D19FF-62CB-4595-B9D0-B12AB85BB9EA}"/>
+              </a:ext>
+            </a:extLst>
+          </p:cNvPr>
+          <p:cNvSpPr>
+            <a:spLocks noGrp="1"/>
+          </p:cNvSpPr>
+          <p:nvPr>
+            <p:ph type="title"/>
+          </p:nvPr>
+        </p:nvSpPr>
+        <p:spPr/>
+        <p:txBody>
+          <a:bodyPr/>
+          <a:lstStyle/>
+          <a:p>
+            <a:r>
+              <a:rPr lang="en-US" dirty="0"/>
+              <a:t>Creating a custom message</a:t>
+            </a:r>
+          </a:p>
+        </p:txBody>
+      </p:sp>
+      <p:sp>
+        <p:nvSpPr>
+          <p:cNvPr id="3" name="Content Placeholder 2">
+            <a:extLst>
+              <a:ext uri="{FF2B5EF4-FFF2-40B4-BE49-F238E27FC236}">
+                <a16:creationId xmlns:a16="http://schemas.microsoft.com/office/drawing/2014/main" id="{FE838631-974B-4244-B891-55CADCA3D715}"/>
+              </a:ext>
+            </a:extLst>
+          </p:cNvPr>
+          <p:cNvSpPr>
+            <a:spLocks noGrp="1"/>
+          </p:cNvSpPr>
+          <p:nvPr>
+            <p:ph idx="1"/>
+          </p:nvPr>
+        </p:nvSpPr>
+        <p:spPr/>
+        <p:txBody>
+          <a:bodyPr/>
+          <a:lstStyle/>
+          <a:p>
+            <a:r>
+              <a:rPr lang="en-US" dirty="0"/>
+              <a:t>Creating a custom message:</a:t>
+            </a:r>
+          </a:p>
+          <a:p>
+            <a:pPr lvl="1"/>
+            <a:r>
+              <a:rPr lang="en-US" dirty="0"/>
+              <a:t>In your package, create a new folder named </a:t>
+            </a:r>
+            <a:r>
+              <a:rPr lang="en-US" b="1" dirty="0"/>
+              <a:t>msg</a:t>
+            </a:r>
+            <a:r>
+              <a:rPr lang="en-US" dirty="0"/>
+              <a:t>: $ </a:t>
+            </a:r>
+            <a:r>
+              <a:rPr lang="en-US" dirty="0">
+                <a:latin typeface="Courier New" panose="02070309020205020404" pitchFamily="49" charset="0"/>
+                <a:cs typeface="Courier New" panose="02070309020205020404" pitchFamily="49" charset="0"/>
+              </a:rPr>
+              <a:t>mkdir msg</a:t>
+            </a:r>
+            <a:br>
+              <a:rPr lang="en-US" dirty="0"/>
+            </a:br>
+            <a:r>
+              <a:rPr lang="en-US" dirty="0"/>
+              <a:t>(use $ </a:t>
+            </a:r>
+            <a:r>
+              <a:rPr lang="en-US" dirty="0">
+                <a:latin typeface="Courier New" panose="02070309020205020404" pitchFamily="49" charset="0"/>
+                <a:cs typeface="Courier New" panose="02070309020205020404" pitchFamily="49" charset="0"/>
+              </a:rPr>
+              <a:t>cd ~/catkin_ws/src/&lt;package_name&gt;</a:t>
+            </a:r>
+            <a:r>
+              <a:rPr lang="en-US" dirty="0"/>
+              <a:t> to navigate to your package)</a:t>
+            </a:r>
+          </a:p>
+          <a:p>
+            <a:pPr lvl="1"/>
+            <a:r>
+              <a:rPr lang="en-US" dirty="0"/>
+              <a:t>Create a new text file </a:t>
+            </a:r>
+            <a:r>
+              <a:rPr lang="en-US" u="sng" dirty="0"/>
+              <a:t>in your msg folder</a:t>
+            </a:r>
+            <a:r>
+              <a:rPr lang="en-US" dirty="0"/>
+              <a:t> and name it ID.msg (the name can be anything): $ </a:t>
+            </a:r>
+            <a:r>
+              <a:rPr lang="en-US" dirty="0">
+                <a:latin typeface="Courier New" panose="02070309020205020404" pitchFamily="49" charset="0"/>
+                <a:cs typeface="Courier New" panose="02070309020205020404" pitchFamily="49" charset="0"/>
+              </a:rPr>
+              <a:t>gedit ID.msg  </a:t>
+            </a:r>
+          </a:p>
+          <a:p>
+            <a:pPr lvl="1"/>
+            <a:r>
+              <a:rPr lang="en-US" dirty="0"/>
+              <a:t>Add the fields you want to send over your ROS topic. In this case, we are sending an unsigned integer and 2 strings</a:t>
+            </a:r>
+          </a:p>
+        </p:txBody>
+      </p:sp>
+    </p:spTree>
+    <p:extLst>
+      <p:ext uri="{BB962C8B-B14F-4D97-AF65-F5344CB8AC3E}">
+        <p14:creationId xmlns:p14="http://schemas.microsoft.com/office/powerpoint/2010/main" val="3593007750"/>
+      </p:ext>
+    </p:extLst>
+  </p:cSld>
+  <p:clrMapOvr>
+    <a:masterClrMapping/>
+  </p:clrMapOvr>
+</p:sld>
+</file>
+
+<file path=ppt/slides/slide11.xml><?xml version="1.0" encoding="utf-8"?>
+<p:sld xmlns:a="http://schemas.openxmlformats.org/drawingml/2006/main" xmlns:r="http://schemas.openxmlformats.org/officeDocument/2006/relationships" xmlns:p="http://schemas.openxmlformats.org/presentationml/2006/main">
+  <p:cSld>
     <p:bg>
       <p:bgPr>
         <a:solidFill>
@@ -3332,7 +3489,7 @@
           <p:cNvPr id="2" name="Title 1">
             <a:extLst>
               <a:ext uri="{FF2B5EF4-FFF2-40B4-BE49-F238E27FC236}">
-                <a16:creationId xmlns:a16="http://schemas.microsoft.com/office/drawing/2014/main" id="{77CCBE19-5BA8-4B80-9E26-0BA5266FA7E2}"/>
+                <a16:creationId xmlns:a16="http://schemas.microsoft.com/office/drawing/2014/main" id="{C741F90C-425C-4B81-93EF-3264BC7BFDF1}"/>
               </a:ext>
             </a:extLst>
           </p:cNvPr>
@@ -3356,14 +3513,308 @@
           <a:lstStyle/>
           <a:p>
             <a:r>
-              <a:rPr lang="en-US" sz="1800"/>
-              <a:t>Working with ros topics </a:t>
+              <a:rPr lang="en-US" sz="1800" dirty="0"/>
+              <a:t>publisher</a:t>
             </a:r>
             <a:br>
-              <a:rPr lang="en-US" sz="1800"/>
+              <a:rPr lang="en-US" sz="1800" dirty="0"/>
             </a:br>
             <a:r>
-              <a:rPr lang="en-US" sz="1800"/>
+              <a:rPr lang="en-US" sz="1800" dirty="0"/>
+              <a:t>(custom messages)</a:t>
+            </a:r>
+          </a:p>
+        </p:txBody>
+      </p:sp>
+      <p:sp>
+        <p:nvSpPr>
+          <p:cNvPr id="3" name="Content Placeholder 2">
+            <a:extLst>
+              <a:ext uri="{FF2B5EF4-FFF2-40B4-BE49-F238E27FC236}">
+                <a16:creationId xmlns:a16="http://schemas.microsoft.com/office/drawing/2014/main" id="{FEB8B432-26DB-44FA-978B-060CAFC3CF7E}"/>
+              </a:ext>
+            </a:extLst>
+          </p:cNvPr>
+          <p:cNvSpPr>
+            <a:spLocks noGrp="1"/>
+          </p:cNvSpPr>
+          <p:nvPr>
+            <p:ph idx="1"/>
+          </p:nvPr>
+        </p:nvSpPr>
+        <p:spPr>
+          <a:xfrm>
+            <a:off x="803244" y="2638044"/>
+            <a:ext cx="3063765" cy="3263206"/>
+          </a:xfrm>
+        </p:spPr>
+        <p:txBody>
+          <a:bodyPr>
+            <a:normAutofit/>
+          </a:bodyPr>
+          <a:lstStyle/>
+          <a:p>
+            <a:r>
+              <a:rPr lang="en-US" dirty="0"/>
+              <a:t>Here we have an example of a custom publisher</a:t>
+            </a:r>
+          </a:p>
+          <a:p>
+            <a:r>
+              <a:rPr lang="en-US" dirty="0"/>
+              <a:t>The key differences are: </a:t>
+            </a:r>
+          </a:p>
+          <a:p>
+            <a:pPr lvl="1"/>
+            <a:r>
+              <a:rPr lang="en-US" dirty="0"/>
+              <a:t>We include the .msg file as a header to use the message</a:t>
+            </a:r>
+          </a:p>
+          <a:p>
+            <a:pPr lvl="1"/>
+            <a:r>
+              <a:rPr lang="en-US" dirty="0"/>
+              <a:t>The message file name is treated as if it was a struct</a:t>
+            </a:r>
+          </a:p>
+        </p:txBody>
+      </p:sp>
+      <p:sp>
+        <p:nvSpPr>
+          <p:cNvPr id="9" name="Rectangle 8">
+            <a:extLst>
+              <a:ext uri="{FF2B5EF4-FFF2-40B4-BE49-F238E27FC236}">
+                <a16:creationId xmlns:a16="http://schemas.microsoft.com/office/drawing/2014/main" id="{6515FC82-3453-4CBE-8895-4CCFF339529E}"/>
+              </a:ext>
+              <a:ext uri="{C183D7F6-B498-43B3-948B-1728B52AA6E4}">
+                <adec:decorative xmlns:adec="http://schemas.microsoft.com/office/drawing/2017/decorative" val="1"/>
+              </a:ext>
+            </a:extLst>
+          </p:cNvPr>
+          <p:cNvSpPr>
+            <a:spLocks noGrp="1" noRot="1" noChangeAspect="1" noMove="1" noResize="1" noEditPoints="1" noAdjustHandles="1" noChangeArrowheads="1" noChangeShapeType="1" noTextEdit="1"/>
+          </p:cNvSpPr>
+          <p:nvPr>
+            <p:extLst>
+              <p:ext uri="{386F3935-93C4-4BCD-93E2-E3B085C9AB24}">
+                <p16:designElem xmlns:p16="http://schemas.microsoft.com/office/powerpoint/2015/main" val="1"/>
+              </p:ext>
+            </p:extLst>
+          </p:nvPr>
+        </p:nvSpPr>
+        <p:spPr>
+          <a:xfrm>
+            <a:off x="4494182" y="964692"/>
+            <a:ext cx="6885432" cy="4936558"/>
+          </a:xfrm>
+          <a:prstGeom prst="rect">
+            <a:avLst/>
+          </a:prstGeom>
+          <a:noFill/>
+          <a:ln w="31750" cap="sq">
+            <a:solidFill>
+              <a:srgbClr val="FFFFFF"/>
+            </a:solidFill>
+            <a:miter lim="800000"/>
+          </a:ln>
+        </p:spPr>
+        <p:style>
+          <a:lnRef idx="2">
+            <a:schemeClr val="accent1">
+              <a:shade val="50000"/>
+            </a:schemeClr>
+          </a:lnRef>
+          <a:fillRef idx="1">
+            <a:schemeClr val="accent1"/>
+          </a:fillRef>
+          <a:effectRef idx="0">
+            <a:schemeClr val="accent1"/>
+          </a:effectRef>
+          <a:fontRef idx="minor">
+            <a:schemeClr val="lt1"/>
+          </a:fontRef>
+        </p:style>
+        <p:txBody>
+          <a:bodyPr rtlCol="0" anchor="ctr"/>
+          <a:lstStyle/>
+          <a:p>
+            <a:pPr algn="ctr"/>
+            <a:endParaRPr lang="en-US" dirty="0"/>
+          </a:p>
+        </p:txBody>
+      </p:sp>
+      <p:sp>
+        <p:nvSpPr>
+          <p:cNvPr id="11" name="Rectangle 10">
+            <a:extLst>
+              <a:ext uri="{FF2B5EF4-FFF2-40B4-BE49-F238E27FC236}">
+                <a16:creationId xmlns:a16="http://schemas.microsoft.com/office/drawing/2014/main" id="{C5FD847B-65C0-4027-8DFC-70CB424514F8}"/>
+              </a:ext>
+              <a:ext uri="{C183D7F6-B498-43B3-948B-1728B52AA6E4}">
+                <adec:decorative xmlns:adec="http://schemas.microsoft.com/office/drawing/2017/decorative" val="1"/>
+              </a:ext>
+            </a:extLst>
+          </p:cNvPr>
+          <p:cNvSpPr>
+            <a:spLocks noGrp="1" noRot="1" noChangeAspect="1" noMove="1" noResize="1" noEditPoints="1" noAdjustHandles="1" noChangeArrowheads="1" noChangeShapeType="1" noTextEdit="1"/>
+          </p:cNvSpPr>
+          <p:nvPr>
+            <p:extLst>
+              <p:ext uri="{386F3935-93C4-4BCD-93E2-E3B085C9AB24}">
+                <p16:designElem xmlns:p16="http://schemas.microsoft.com/office/powerpoint/2015/main" val="1"/>
+              </p:ext>
+            </p:extLst>
+          </p:nvPr>
+        </p:nvSpPr>
+        <p:spPr>
+          <a:xfrm>
+            <a:off x="4657802" y="1128683"/>
+            <a:ext cx="6558192" cy="4608576"/>
+          </a:xfrm>
+          <a:prstGeom prst="rect">
+            <a:avLst/>
+          </a:prstGeom>
+          <a:solidFill>
+            <a:srgbClr val="FFFFFF"/>
+          </a:solidFill>
+          <a:ln>
+            <a:noFill/>
+          </a:ln>
+        </p:spPr>
+        <p:style>
+          <a:lnRef idx="2">
+            <a:schemeClr val="accent1">
+              <a:shade val="50000"/>
+            </a:schemeClr>
+          </a:lnRef>
+          <a:fillRef idx="1">
+            <a:schemeClr val="accent1"/>
+          </a:fillRef>
+          <a:effectRef idx="0">
+            <a:schemeClr val="accent1"/>
+          </a:effectRef>
+          <a:fontRef idx="minor">
+            <a:schemeClr val="lt1"/>
+          </a:fontRef>
+        </p:style>
+        <p:txBody>
+          <a:bodyPr rtlCol="0" anchor="ctr"/>
+          <a:lstStyle/>
+          <a:p>
+            <a:pPr algn="ctr"/>
+            <a:endParaRPr lang="en-US"/>
+          </a:p>
+        </p:txBody>
+      </p:sp>
+      <p:pic>
+        <p:nvPicPr>
+          <p:cNvPr id="4" name="Picture 3">
+            <a:extLst>
+              <a:ext uri="{FF2B5EF4-FFF2-40B4-BE49-F238E27FC236}">
+                <a16:creationId xmlns:a16="http://schemas.microsoft.com/office/drawing/2014/main" id="{8F1CAA98-B9E5-4455-856C-E356E9A7D80C}"/>
+              </a:ext>
+            </a:extLst>
+          </p:cNvPr>
+          <p:cNvPicPr>
+            <a:picLocks noChangeAspect="1"/>
+          </p:cNvPicPr>
+          <p:nvPr/>
+        </p:nvPicPr>
+        <p:blipFill>
+          <a:blip r:embed="rId2"/>
+          <a:stretch>
+            <a:fillRect/>
+          </a:stretch>
+        </p:blipFill>
+        <p:spPr>
+          <a:xfrm>
+            <a:off x="4823366" y="1525932"/>
+            <a:ext cx="6227064" cy="3814077"/>
+          </a:xfrm>
+          <a:prstGeom prst="rect">
+            <a:avLst/>
+          </a:prstGeom>
+        </p:spPr>
+      </p:pic>
+    </p:spTree>
+    <p:extLst>
+      <p:ext uri="{BB962C8B-B14F-4D97-AF65-F5344CB8AC3E}">
+        <p14:creationId xmlns:p14="http://schemas.microsoft.com/office/powerpoint/2010/main" val="801102462"/>
+      </p:ext>
+    </p:extLst>
+  </p:cSld>
+  <p:clrMapOvr>
+    <a:masterClrMapping/>
+  </p:clrMapOvr>
+</p:sld>
+</file>
+
+<file path=ppt/slides/slide12.xml><?xml version="1.0" encoding="utf-8"?>
+<p:sld xmlns:a="http://schemas.openxmlformats.org/drawingml/2006/main" xmlns:r="http://schemas.openxmlformats.org/officeDocument/2006/relationships" xmlns:p="http://schemas.openxmlformats.org/presentationml/2006/main">
+  <p:cSld>
+    <p:bg>
+      <p:bgPr>
+        <a:solidFill>
+          <a:schemeClr val="bg1">
+            <a:lumMod val="95000"/>
+          </a:schemeClr>
+        </a:solidFill>
+        <a:effectLst/>
+      </p:bgPr>
+    </p:bg>
+    <p:spTree>
+      <p:nvGrpSpPr>
+        <p:cNvPr id="1" name=""/>
+        <p:cNvGrpSpPr/>
+        <p:nvPr/>
+      </p:nvGrpSpPr>
+      <p:grpSpPr>
+        <a:xfrm>
+          <a:off x="0" y="0"/>
+          <a:ext cx="0" cy="0"/>
+          <a:chOff x="0" y="0"/>
+          <a:chExt cx="0" cy="0"/>
+        </a:xfrm>
+      </p:grpSpPr>
+      <p:sp>
+        <p:nvSpPr>
+          <p:cNvPr id="2" name="Title 1">
+            <a:extLst>
+              <a:ext uri="{FF2B5EF4-FFF2-40B4-BE49-F238E27FC236}">
+                <a16:creationId xmlns:a16="http://schemas.microsoft.com/office/drawing/2014/main" id="{77CCBE19-5BA8-4B80-9E26-0BA5266FA7E2}"/>
+              </a:ext>
+            </a:extLst>
+          </p:cNvPr>
+          <p:cNvSpPr>
+            <a:spLocks noGrp="1"/>
+          </p:cNvSpPr>
+          <p:nvPr>
+            <p:ph type="title"/>
+          </p:nvPr>
+        </p:nvSpPr>
+        <p:spPr>
+          <a:xfrm>
+            <a:off x="804672" y="964692"/>
+            <a:ext cx="3066937" cy="1188720"/>
+          </a:xfrm>
+        </p:spPr>
+        <p:txBody>
+          <a:bodyPr>
+            <a:normAutofit/>
+          </a:bodyPr>
+          <a:lstStyle/>
+          <a:p>
+            <a:r>
+              <a:rPr lang="en-US" sz="1800" dirty="0"/>
+              <a:t>subscriber</a:t>
+            </a:r>
+            <a:br>
+              <a:rPr lang="en-US" sz="1800" dirty="0"/>
+            </a:br>
+            <a:r>
+              <a:rPr lang="en-US" sz="1800" dirty="0"/>
               <a:t>(custom messages)</a:t>
             </a:r>
           </a:p>
@@ -3583,310 +4034,6 @@
 </p:sld>
 </file>
 
-<file path=ppt/slides/slide11.xml><?xml version="1.0" encoding="utf-8"?>
-<p:sld xmlns:a="http://schemas.openxmlformats.org/drawingml/2006/main" xmlns:r="http://schemas.openxmlformats.org/officeDocument/2006/relationships" xmlns:p="http://schemas.openxmlformats.org/presentationml/2006/main">
-  <p:cSld>
-    <p:spTree>
-      <p:nvGrpSpPr>
-        <p:cNvPr id="1" name=""/>
-        <p:cNvGrpSpPr/>
-        <p:nvPr/>
-      </p:nvGrpSpPr>
-      <p:grpSpPr>
-        <a:xfrm>
-          <a:off x="0" y="0"/>
-          <a:ext cx="0" cy="0"/>
-          <a:chOff x="0" y="0"/>
-          <a:chExt cx="0" cy="0"/>
-        </a:xfrm>
-      </p:grpSpPr>
-      <p:sp>
-        <p:nvSpPr>
-          <p:cNvPr id="2" name="Title 1">
-            <a:extLst>
-              <a:ext uri="{FF2B5EF4-FFF2-40B4-BE49-F238E27FC236}">
-                <a16:creationId xmlns:a16="http://schemas.microsoft.com/office/drawing/2014/main" id="{96E73DDB-CE0E-4318-9674-B0534D597B78}"/>
-              </a:ext>
-            </a:extLst>
-          </p:cNvPr>
-          <p:cNvSpPr>
-            <a:spLocks noGrp="1"/>
-          </p:cNvSpPr>
-          <p:nvPr>
-            <p:ph type="title"/>
-          </p:nvPr>
-        </p:nvSpPr>
-        <p:spPr/>
-        <p:txBody>
-          <a:bodyPr/>
-          <a:lstStyle/>
-          <a:p>
-            <a:r>
-              <a:rPr lang="en-US" dirty="0"/>
-              <a:t>Pub/sub sending custom messages</a:t>
-            </a:r>
-          </a:p>
-        </p:txBody>
-      </p:sp>
-      <p:sp>
-        <p:nvSpPr>
-          <p:cNvPr id="3" name="Content Placeholder 2">
-            <a:extLst>
-              <a:ext uri="{FF2B5EF4-FFF2-40B4-BE49-F238E27FC236}">
-                <a16:creationId xmlns:a16="http://schemas.microsoft.com/office/drawing/2014/main" id="{F3C8CE3F-A0FE-45C8-B6D2-22E0B4C8152A}"/>
-              </a:ext>
-            </a:extLst>
-          </p:cNvPr>
-          <p:cNvSpPr>
-            <a:spLocks noGrp="1"/>
-          </p:cNvSpPr>
-          <p:nvPr>
-            <p:ph idx="1"/>
-          </p:nvPr>
-        </p:nvSpPr>
-        <p:spPr/>
-        <p:txBody>
-          <a:bodyPr/>
-          <a:lstStyle/>
-          <a:p>
-            <a:r>
-              <a:rPr lang="en-US" dirty="0"/>
-              <a:t>The CMakeList.txt file needs the same modification as with the standard message.</a:t>
-            </a:r>
-          </a:p>
-          <a:p>
-            <a:r>
-              <a:rPr lang="en-US" dirty="0"/>
-              <a:t>In addition to that, we also need to include the message file by including:</a:t>
-            </a:r>
-          </a:p>
-          <a:p>
-            <a:pPr lvl="1"/>
-            <a:r>
-              <a:rPr lang="en-US" dirty="0" err="1">
-                <a:latin typeface="Courier New" panose="02070309020205020404" pitchFamily="49" charset="0"/>
-                <a:cs typeface="Courier New" panose="02070309020205020404" pitchFamily="49" charset="0"/>
-              </a:rPr>
-              <a:t>Add_messages_files</a:t>
-            </a:r>
-            <a:r>
-              <a:rPr lang="en-US" dirty="0">
-                <a:latin typeface="Courier New" panose="02070309020205020404" pitchFamily="49" charset="0"/>
-                <a:cs typeface="Courier New" panose="02070309020205020404" pitchFamily="49" charset="0"/>
-              </a:rPr>
-              <a:t>(DIRECTORY msg FILES ID.msg)</a:t>
-            </a:r>
-          </a:p>
-          <a:p>
-            <a:r>
-              <a:rPr lang="en-US" dirty="0"/>
-              <a:t>We then build and run the nodes normally.</a:t>
-            </a:r>
-          </a:p>
-          <a:p>
-            <a:pPr lvl="1"/>
-            <a:endParaRPr lang="en-US" dirty="0"/>
-          </a:p>
-        </p:txBody>
-      </p:sp>
-    </p:spTree>
-    <p:extLst>
-      <p:ext uri="{BB962C8B-B14F-4D97-AF65-F5344CB8AC3E}">
-        <p14:creationId xmlns:p14="http://schemas.microsoft.com/office/powerpoint/2010/main" val="829575635"/>
-      </p:ext>
-    </p:extLst>
-  </p:cSld>
-  <p:clrMapOvr>
-    <a:masterClrMapping/>
-  </p:clrMapOvr>
-</p:sld>
-</file>
-
-<file path=ppt/slides/slide12.xml><?xml version="1.0" encoding="utf-8"?>
-<p:sld xmlns:a="http://schemas.openxmlformats.org/drawingml/2006/main" xmlns:r="http://schemas.openxmlformats.org/officeDocument/2006/relationships" xmlns:p="http://schemas.openxmlformats.org/presentationml/2006/main">
-  <p:cSld>
-    <p:spTree>
-      <p:nvGrpSpPr>
-        <p:cNvPr id="1" name=""/>
-        <p:cNvGrpSpPr/>
-        <p:nvPr/>
-      </p:nvGrpSpPr>
-      <p:grpSpPr>
-        <a:xfrm>
-          <a:off x="0" y="0"/>
-          <a:ext cx="0" cy="0"/>
-          <a:chOff x="0" y="0"/>
-          <a:chExt cx="0" cy="0"/>
-        </a:xfrm>
-      </p:grpSpPr>
-      <p:sp>
-        <p:nvSpPr>
-          <p:cNvPr id="2" name="Title 1">
-            <a:extLst>
-              <a:ext uri="{FF2B5EF4-FFF2-40B4-BE49-F238E27FC236}">
-                <a16:creationId xmlns:a16="http://schemas.microsoft.com/office/drawing/2014/main" id="{0D6F2181-AF75-488A-BB78-9DC8CDCC60B9}"/>
-              </a:ext>
-            </a:extLst>
-          </p:cNvPr>
-          <p:cNvSpPr>
-            <a:spLocks noGrp="1"/>
-          </p:cNvSpPr>
-          <p:nvPr>
-            <p:ph type="title"/>
-          </p:nvPr>
-        </p:nvSpPr>
-        <p:spPr/>
-        <p:txBody>
-          <a:bodyPr/>
-          <a:lstStyle/>
-          <a:p>
-            <a:r>
-              <a:rPr lang="en-US" dirty="0"/>
-              <a:t>Working with ros topics </a:t>
-            </a:r>
-            <a:br>
-              <a:rPr lang="en-US" dirty="0"/>
-            </a:br>
-            <a:r>
-              <a:rPr lang="en-US" dirty="0"/>
-              <a:t>(Ros::spin() and ros::spinOnce())</a:t>
-            </a:r>
-          </a:p>
-        </p:txBody>
-      </p:sp>
-      <p:sp>
-        <p:nvSpPr>
-          <p:cNvPr id="3" name="Content Placeholder 2">
-            <a:extLst>
-              <a:ext uri="{FF2B5EF4-FFF2-40B4-BE49-F238E27FC236}">
-                <a16:creationId xmlns:a16="http://schemas.microsoft.com/office/drawing/2014/main" id="{47ADCD28-E4BD-4915-9EBE-091EEAB2035D}"/>
-              </a:ext>
-            </a:extLst>
-          </p:cNvPr>
-          <p:cNvSpPr>
-            <a:spLocks noGrp="1"/>
-          </p:cNvSpPr>
-          <p:nvPr>
-            <p:ph idx="1"/>
-          </p:nvPr>
-        </p:nvSpPr>
-        <p:spPr/>
-        <p:txBody>
-          <a:bodyPr/>
-          <a:lstStyle/>
-          <a:p>
-            <a:r>
-              <a:rPr lang="en-US" dirty="0"/>
-              <a:t>In the preceding examples, the publisher has </a:t>
-            </a:r>
-            <a:r>
-              <a:rPr lang="en-US" dirty="0">
-                <a:latin typeface="Courier New" panose="02070309020205020404" pitchFamily="49" charset="0"/>
-                <a:cs typeface="Courier New" panose="02070309020205020404" pitchFamily="49" charset="0"/>
-              </a:rPr>
-              <a:t>ros::spinOnce()</a:t>
-            </a:r>
-            <a:r>
-              <a:rPr lang="en-US" dirty="0"/>
-              <a:t> and the subscriber has </a:t>
-            </a:r>
-            <a:r>
-              <a:rPr lang="en-US" dirty="0">
-                <a:latin typeface="Courier New" panose="02070309020205020404" pitchFamily="49" charset="0"/>
-                <a:cs typeface="Courier New" panose="02070309020205020404" pitchFamily="49" charset="0"/>
-              </a:rPr>
-              <a:t>ros::spin()</a:t>
-            </a:r>
-            <a:r>
-              <a:rPr lang="en-US" dirty="0"/>
-              <a:t>,</a:t>
-            </a:r>
-            <a:r>
-              <a:rPr lang="en-US" dirty="0">
-                <a:latin typeface="Courier New" panose="02070309020205020404" pitchFamily="49" charset="0"/>
-                <a:cs typeface="Courier New" panose="02070309020205020404" pitchFamily="49" charset="0"/>
-              </a:rPr>
-              <a:t> </a:t>
-            </a:r>
-            <a:r>
-              <a:rPr lang="en-US" dirty="0"/>
-              <a:t>both are used to give control over to ROS, however, they are slightly different.</a:t>
-            </a:r>
-          </a:p>
-          <a:p>
-            <a:r>
-              <a:rPr lang="en-US" dirty="0">
-                <a:latin typeface="Courier New" panose="02070309020205020404" pitchFamily="49" charset="0"/>
-                <a:cs typeface="Courier New" panose="02070309020205020404" pitchFamily="49" charset="0"/>
-              </a:rPr>
-              <a:t>ros::spinOnce() </a:t>
-            </a:r>
-            <a:r>
-              <a:rPr lang="en-US" dirty="0"/>
-              <a:t>tells ROS to execute all pending callbacks from the node’s subscription and </a:t>
-            </a:r>
-            <a:r>
-              <a:rPr lang="en-US" u="sng" dirty="0"/>
-              <a:t>return the control back to us</a:t>
-            </a:r>
-            <a:endParaRPr lang="en-US" dirty="0"/>
-          </a:p>
-          <a:p>
-            <a:r>
-              <a:rPr lang="en-US" dirty="0">
-                <a:latin typeface="Courier New" panose="02070309020205020404" pitchFamily="49" charset="0"/>
-                <a:cs typeface="Courier New" panose="02070309020205020404" pitchFamily="49" charset="0"/>
-              </a:rPr>
-              <a:t>ros::spin() </a:t>
-            </a:r>
-            <a:r>
-              <a:rPr lang="en-US" dirty="0"/>
-              <a:t>tells ROS to wait for and execute callbacks </a:t>
-            </a:r>
-            <a:r>
-              <a:rPr lang="en-US" u="sng" dirty="0"/>
-              <a:t>until the node shuts down</a:t>
-            </a:r>
-          </a:p>
-          <a:p>
-            <a:r>
-              <a:rPr lang="en-US" dirty="0"/>
-              <a:t>If your program has repetitive work to do (other than responding to callbacks)  then use </a:t>
-            </a:r>
-            <a:r>
-              <a:rPr lang="en-US" dirty="0">
-                <a:latin typeface="Courier New" panose="02070309020205020404" pitchFamily="49" charset="0"/>
-                <a:cs typeface="Courier New" panose="02070309020205020404" pitchFamily="49" charset="0"/>
-              </a:rPr>
-              <a:t>ros::spinOnce(). </a:t>
-            </a:r>
-            <a:r>
-              <a:rPr lang="en-US" dirty="0"/>
-              <a:t>Otherwise use </a:t>
-            </a:r>
-            <a:r>
-              <a:rPr lang="en-US" dirty="0">
-                <a:latin typeface="Courier New" panose="02070309020205020404" pitchFamily="49" charset="0"/>
-                <a:cs typeface="Courier New" panose="02070309020205020404" pitchFamily="49" charset="0"/>
-              </a:rPr>
-              <a:t>ros::spin() </a:t>
-            </a:r>
-          </a:p>
-        </p:txBody>
-      </p:sp>
-    </p:spTree>
-    <p:extLst>
-      <p:ext uri="{BB962C8B-B14F-4D97-AF65-F5344CB8AC3E}">
-        <p14:creationId xmlns:p14="http://schemas.microsoft.com/office/powerpoint/2010/main" val="3927932360"/>
-      </p:ext>
-    </p:extLst>
-  </p:cSld>
-  <p:clrMapOvr>
-    <a:masterClrMapping/>
-  </p:clrMapOvr>
-</p:sld>
-</file>
-
 <file path=ppt/slides/slide13.xml><?xml version="1.0" encoding="utf-8"?>
 <p:sld xmlns:a="http://schemas.openxmlformats.org/drawingml/2006/main" xmlns:r="http://schemas.openxmlformats.org/officeDocument/2006/relationships" xmlns:p="http://schemas.openxmlformats.org/presentationml/2006/main">
   <p:cSld>
@@ -3909,6 +4056,296 @@
           <p:cNvPr id="2" name="Title 1">
             <a:extLst>
               <a:ext uri="{FF2B5EF4-FFF2-40B4-BE49-F238E27FC236}">
+                <a16:creationId xmlns:a16="http://schemas.microsoft.com/office/drawing/2014/main" id="{96E73DDB-CE0E-4318-9674-B0534D597B78}"/>
+              </a:ext>
+            </a:extLst>
+          </p:cNvPr>
+          <p:cNvSpPr>
+            <a:spLocks noGrp="1"/>
+          </p:cNvSpPr>
+          <p:nvPr>
+            <p:ph type="title"/>
+          </p:nvPr>
+        </p:nvSpPr>
+        <p:spPr/>
+        <p:txBody>
+          <a:bodyPr/>
+          <a:lstStyle/>
+          <a:p>
+            <a:r>
+              <a:rPr lang="en-US" dirty="0"/>
+              <a:t>Build and run</a:t>
+            </a:r>
+          </a:p>
+        </p:txBody>
+      </p:sp>
+      <p:sp>
+        <p:nvSpPr>
+          <p:cNvPr id="3" name="Content Placeholder 2">
+            <a:extLst>
+              <a:ext uri="{FF2B5EF4-FFF2-40B4-BE49-F238E27FC236}">
+                <a16:creationId xmlns:a16="http://schemas.microsoft.com/office/drawing/2014/main" id="{F3C8CE3F-A0FE-45C8-B6D2-22E0B4C8152A}"/>
+              </a:ext>
+            </a:extLst>
+          </p:cNvPr>
+          <p:cNvSpPr>
+            <a:spLocks noGrp="1"/>
+          </p:cNvSpPr>
+          <p:nvPr>
+            <p:ph idx="1"/>
+          </p:nvPr>
+        </p:nvSpPr>
+        <p:spPr/>
+        <p:txBody>
+          <a:bodyPr/>
+          <a:lstStyle/>
+          <a:p>
+            <a:r>
+              <a:rPr lang="en-US" dirty="0"/>
+              <a:t>The CMakeList.txt file needs the same modification as with the standard message.</a:t>
+            </a:r>
+          </a:p>
+          <a:p>
+            <a:r>
+              <a:rPr lang="en-US" dirty="0"/>
+              <a:t>In addition to that, we also need to include the message file by including:</a:t>
+            </a:r>
+          </a:p>
+          <a:p>
+            <a:pPr lvl="1"/>
+            <a:r>
+              <a:rPr lang="en-US" dirty="0">
+                <a:latin typeface="Courier New" panose="02070309020205020404" pitchFamily="49" charset="0"/>
+                <a:cs typeface="Courier New" panose="02070309020205020404" pitchFamily="49" charset="0"/>
+              </a:rPr>
+              <a:t>add_messages_files(DIRECTORY msg FILES ID.msg)</a:t>
+            </a:r>
+          </a:p>
+          <a:p>
+            <a:r>
+              <a:rPr lang="en-US" dirty="0"/>
+              <a:t>We then build and run the nodes normally.</a:t>
+            </a:r>
+          </a:p>
+          <a:p>
+            <a:pPr lvl="1"/>
+            <a:endParaRPr lang="en-US" dirty="0"/>
+          </a:p>
+        </p:txBody>
+      </p:sp>
+    </p:spTree>
+    <p:extLst>
+      <p:ext uri="{BB962C8B-B14F-4D97-AF65-F5344CB8AC3E}">
+        <p14:creationId xmlns:p14="http://schemas.microsoft.com/office/powerpoint/2010/main" val="829575635"/>
+      </p:ext>
+    </p:extLst>
+  </p:cSld>
+  <p:clrMapOvr>
+    <a:masterClrMapping/>
+  </p:clrMapOvr>
+</p:sld>
+</file>
+
+<file path=ppt/slides/slide14.xml><?xml version="1.0" encoding="utf-8"?>
+<p:sld xmlns:a="http://schemas.openxmlformats.org/drawingml/2006/main" xmlns:r="http://schemas.openxmlformats.org/officeDocument/2006/relationships" xmlns:p="http://schemas.openxmlformats.org/presentationml/2006/main">
+  <p:cSld>
+    <p:spTree>
+      <p:nvGrpSpPr>
+        <p:cNvPr id="1" name=""/>
+        <p:cNvGrpSpPr/>
+        <p:nvPr/>
+      </p:nvGrpSpPr>
+      <p:grpSpPr>
+        <a:xfrm>
+          <a:off x="0" y="0"/>
+          <a:ext cx="0" cy="0"/>
+          <a:chOff x="0" y="0"/>
+          <a:chExt cx="0" cy="0"/>
+        </a:xfrm>
+      </p:grpSpPr>
+      <p:sp>
+        <p:nvSpPr>
+          <p:cNvPr id="2" name="Title 1">
+            <a:extLst>
+              <a:ext uri="{FF2B5EF4-FFF2-40B4-BE49-F238E27FC236}">
+                <a16:creationId xmlns:a16="http://schemas.microsoft.com/office/drawing/2014/main" id="{0D6F2181-AF75-488A-BB78-9DC8CDCC60B9}"/>
+              </a:ext>
+            </a:extLst>
+          </p:cNvPr>
+          <p:cNvSpPr>
+            <a:spLocks noGrp="1"/>
+          </p:cNvSpPr>
+          <p:nvPr>
+            <p:ph type="title"/>
+          </p:nvPr>
+        </p:nvSpPr>
+        <p:spPr/>
+        <p:txBody>
+          <a:bodyPr/>
+          <a:lstStyle/>
+          <a:p>
+            <a:r>
+              <a:rPr lang="en-US" dirty="0"/>
+              <a:t>Ros::spin() and ros::spinOnce()</a:t>
+            </a:r>
+          </a:p>
+        </p:txBody>
+      </p:sp>
+      <p:sp>
+        <p:nvSpPr>
+          <p:cNvPr id="3" name="Content Placeholder 2">
+            <a:extLst>
+              <a:ext uri="{FF2B5EF4-FFF2-40B4-BE49-F238E27FC236}">
+                <a16:creationId xmlns:a16="http://schemas.microsoft.com/office/drawing/2014/main" id="{47ADCD28-E4BD-4915-9EBE-091EEAB2035D}"/>
+              </a:ext>
+            </a:extLst>
+          </p:cNvPr>
+          <p:cNvSpPr>
+            <a:spLocks noGrp="1"/>
+          </p:cNvSpPr>
+          <p:nvPr>
+            <p:ph idx="1"/>
+          </p:nvPr>
+        </p:nvSpPr>
+        <p:spPr/>
+        <p:txBody>
+          <a:bodyPr/>
+          <a:lstStyle/>
+          <a:p>
+            <a:r>
+              <a:rPr lang="en-US" dirty="0"/>
+              <a:t>In the preceding examples, the publisher has </a:t>
+            </a:r>
+            <a:r>
+              <a:rPr lang="en-US" dirty="0">
+                <a:latin typeface="Courier New" panose="02070309020205020404" pitchFamily="49" charset="0"/>
+                <a:cs typeface="Courier New" panose="02070309020205020404" pitchFamily="49" charset="0"/>
+              </a:rPr>
+              <a:t>ros::spinOnce()</a:t>
+            </a:r>
+            <a:r>
+              <a:rPr lang="en-US" dirty="0"/>
+              <a:t> and the subscriber has </a:t>
+            </a:r>
+            <a:r>
+              <a:rPr lang="en-US" dirty="0">
+                <a:latin typeface="Courier New" panose="02070309020205020404" pitchFamily="49" charset="0"/>
+                <a:cs typeface="Courier New" panose="02070309020205020404" pitchFamily="49" charset="0"/>
+              </a:rPr>
+              <a:t>ros::spin()</a:t>
+            </a:r>
+            <a:r>
+              <a:rPr lang="en-US" dirty="0"/>
+              <a:t>,</a:t>
+            </a:r>
+            <a:r>
+              <a:rPr lang="en-US" dirty="0">
+                <a:latin typeface="Courier New" panose="02070309020205020404" pitchFamily="49" charset="0"/>
+                <a:cs typeface="Courier New" panose="02070309020205020404" pitchFamily="49" charset="0"/>
+              </a:rPr>
+              <a:t> </a:t>
+            </a:r>
+            <a:r>
+              <a:rPr lang="en-US" dirty="0"/>
+              <a:t>both are used to give control over to ROS, however, they are slightly different.</a:t>
+            </a:r>
+          </a:p>
+          <a:p>
+            <a:r>
+              <a:rPr lang="en-US" dirty="0">
+                <a:latin typeface="Courier New" panose="02070309020205020404" pitchFamily="49" charset="0"/>
+                <a:cs typeface="Courier New" panose="02070309020205020404" pitchFamily="49" charset="0"/>
+              </a:rPr>
+              <a:t>ros::spinOnce() </a:t>
+            </a:r>
+            <a:r>
+              <a:rPr lang="en-US" dirty="0"/>
+              <a:t>tells ROS to execute all pending callbacks from the node’s subscription and </a:t>
+            </a:r>
+            <a:r>
+              <a:rPr lang="en-US" u="sng" dirty="0"/>
+              <a:t>return the control back to us</a:t>
+            </a:r>
+            <a:endParaRPr lang="en-US" dirty="0"/>
+          </a:p>
+          <a:p>
+            <a:r>
+              <a:rPr lang="en-US" dirty="0">
+                <a:latin typeface="Courier New" panose="02070309020205020404" pitchFamily="49" charset="0"/>
+                <a:cs typeface="Courier New" panose="02070309020205020404" pitchFamily="49" charset="0"/>
+              </a:rPr>
+              <a:t>ros::spin() </a:t>
+            </a:r>
+            <a:r>
+              <a:rPr lang="en-US" dirty="0"/>
+              <a:t>tells ROS to wait for and execute callbacks </a:t>
+            </a:r>
+            <a:r>
+              <a:rPr lang="en-US" u="sng" dirty="0"/>
+              <a:t>until the node shuts down</a:t>
+            </a:r>
+          </a:p>
+          <a:p>
+            <a:r>
+              <a:rPr lang="en-US" dirty="0"/>
+              <a:t>If your program has repetitive work to do (other than responding to callbacks)  then use </a:t>
+            </a:r>
+            <a:r>
+              <a:rPr lang="en-US" dirty="0">
+                <a:latin typeface="Courier New" panose="02070309020205020404" pitchFamily="49" charset="0"/>
+                <a:cs typeface="Courier New" panose="02070309020205020404" pitchFamily="49" charset="0"/>
+              </a:rPr>
+              <a:t>ros::spinOnce(). </a:t>
+            </a:r>
+            <a:r>
+              <a:rPr lang="en-US" dirty="0"/>
+              <a:t>Otherwise use </a:t>
+            </a:r>
+            <a:r>
+              <a:rPr lang="en-US" dirty="0">
+                <a:latin typeface="Courier New" panose="02070309020205020404" pitchFamily="49" charset="0"/>
+                <a:cs typeface="Courier New" panose="02070309020205020404" pitchFamily="49" charset="0"/>
+              </a:rPr>
+              <a:t>ros::spin() </a:t>
+            </a:r>
+          </a:p>
+        </p:txBody>
+      </p:sp>
+    </p:spTree>
+    <p:extLst>
+      <p:ext uri="{BB962C8B-B14F-4D97-AF65-F5344CB8AC3E}">
+        <p14:creationId xmlns:p14="http://schemas.microsoft.com/office/powerpoint/2010/main" val="3927932360"/>
+      </p:ext>
+    </p:extLst>
+  </p:cSld>
+  <p:clrMapOvr>
+    <a:masterClrMapping/>
+  </p:clrMapOvr>
+</p:sld>
+</file>
+
+<file path=ppt/slides/slide15.xml><?xml version="1.0" encoding="utf-8"?>
+<p:sld xmlns:a="http://schemas.openxmlformats.org/drawingml/2006/main" xmlns:r="http://schemas.openxmlformats.org/officeDocument/2006/relationships" xmlns:p="http://schemas.openxmlformats.org/presentationml/2006/main">
+  <p:cSld>
+    <p:spTree>
+      <p:nvGrpSpPr>
+        <p:cNvPr id="1" name=""/>
+        <p:cNvGrpSpPr/>
+        <p:nvPr/>
+      </p:nvGrpSpPr>
+      <p:grpSpPr>
+        <a:xfrm>
+          <a:off x="0" y="0"/>
+          <a:ext cx="0" cy="0"/>
+          <a:chOff x="0" y="0"/>
+          <a:chExt cx="0" cy="0"/>
+        </a:xfrm>
+      </p:grpSpPr>
+      <p:sp>
+        <p:nvSpPr>
+          <p:cNvPr id="2" name="Title 1">
+            <a:extLst>
+              <a:ext uri="{FF2B5EF4-FFF2-40B4-BE49-F238E27FC236}">
                 <a16:creationId xmlns:a16="http://schemas.microsoft.com/office/drawing/2014/main" id="{3231B794-7AF2-42ED-A51E-8C0C3FC2E367}"/>
               </a:ext>
             </a:extLst>
@@ -3927,14 +4364,7 @@
           <a:p>
             <a:r>
               <a:rPr lang="en-US" dirty="0"/>
-              <a:t>Working with ros topics </a:t>
-            </a:r>
-            <a:br>
-              <a:rPr lang="en-US" dirty="0"/>
-            </a:br>
-            <a:r>
-              <a:rPr lang="en-US" dirty="0"/>
-              <a:t>(Conclusion)</a:t>
+              <a:t>conclusion</a:t>
             </a:r>
           </a:p>
         </p:txBody>
@@ -3962,7 +4392,7 @@
           <a:p>
             <a:r>
               <a:rPr lang="en-US" dirty="0"/>
-              <a:t>The communication using topics is fast and unidirectional</a:t>
+              <a:t>The communication using topics is fast many-to-many and unidirectional</a:t>
             </a:r>
           </a:p>
           <a:p>
@@ -4178,6 +4608,182 @@
           <p:cNvPr id="2" name="Title 1">
             <a:extLst>
               <a:ext uri="{FF2B5EF4-FFF2-40B4-BE49-F238E27FC236}">
+                <a16:creationId xmlns:a16="http://schemas.microsoft.com/office/drawing/2014/main" id="{62F9F53C-87A7-4BB7-9921-B69644B25B07}"/>
+              </a:ext>
+            </a:extLst>
+          </p:cNvPr>
+          <p:cNvSpPr>
+            <a:spLocks noGrp="1"/>
+          </p:cNvSpPr>
+          <p:nvPr>
+            <p:ph type="title"/>
+          </p:nvPr>
+        </p:nvSpPr>
+        <p:spPr>
+          <a:xfrm>
+            <a:off x="640079" y="640079"/>
+            <a:ext cx="3402531" cy="5272242"/>
+          </a:xfrm>
+        </p:spPr>
+        <p:txBody>
+          <a:bodyPr>
+            <a:normAutofit/>
+          </a:bodyPr>
+          <a:lstStyle/>
+          <a:p>
+            <a:r>
+              <a:rPr lang="en-US" dirty="0"/>
+              <a:t>Publisher and subscriber</a:t>
+            </a:r>
+          </a:p>
+        </p:txBody>
+      </p:sp>
+      <p:sp>
+        <p:nvSpPr>
+          <p:cNvPr id="3" name="Content Placeholder 2">
+            <a:extLst>
+              <a:ext uri="{FF2B5EF4-FFF2-40B4-BE49-F238E27FC236}">
+                <a16:creationId xmlns:a16="http://schemas.microsoft.com/office/drawing/2014/main" id="{9DE817FE-D08C-44DF-AF68-880099176F84}"/>
+              </a:ext>
+            </a:extLst>
+          </p:cNvPr>
+          <p:cNvSpPr>
+            <a:spLocks noGrp="1"/>
+          </p:cNvSpPr>
+          <p:nvPr>
+            <p:ph idx="1"/>
+          </p:nvPr>
+        </p:nvSpPr>
+        <p:spPr>
+          <a:xfrm>
+            <a:off x="4672103" y="640079"/>
+            <a:ext cx="6883072" cy="2834737"/>
+          </a:xfrm>
+        </p:spPr>
+        <p:txBody>
+          <a:bodyPr>
+            <a:normAutofit/>
+          </a:bodyPr>
+          <a:lstStyle/>
+          <a:p>
+            <a:r>
+              <a:rPr lang="en-US" dirty="0"/>
+              <a:t>Here is an overview of the function of the publisher and subscriber node:</a:t>
+            </a:r>
+          </a:p>
+          <a:p>
+            <a:pPr lvl="1"/>
+            <a:r>
+              <a:rPr lang="en-US" dirty="0"/>
+              <a:t>The publisher advertise the topic to the master and send the message</a:t>
+            </a:r>
+          </a:p>
+          <a:p>
+            <a:pPr lvl="1"/>
+            <a:r>
+              <a:rPr lang="en-US" dirty="0"/>
+              <a:t>The subscriber subscribe to the topic with the master, receive and work with the data in the callback function</a:t>
+            </a:r>
+          </a:p>
+          <a:p>
+            <a:r>
+              <a:rPr lang="en-US" dirty="0"/>
+              <a:t>We will start with sending </a:t>
+            </a:r>
+            <a:r>
+              <a:rPr lang="en-US" dirty="0">
+                <a:hlinkClick r:id="rId2"/>
+              </a:rPr>
+              <a:t>standard ROS messages</a:t>
+            </a:r>
+            <a:br>
+              <a:rPr lang="en-US" dirty="0"/>
+            </a:br>
+            <a:endParaRPr lang="en-US" dirty="0"/>
+          </a:p>
+        </p:txBody>
+      </p:sp>
+      <p:pic>
+        <p:nvPicPr>
+          <p:cNvPr id="9" name="Picture 8">
+            <a:extLst>
+              <a:ext uri="{FF2B5EF4-FFF2-40B4-BE49-F238E27FC236}">
+                <a16:creationId xmlns:a16="http://schemas.microsoft.com/office/drawing/2014/main" id="{828C16BC-C922-40CC-A93B-E657C054B73B}"/>
+              </a:ext>
+            </a:extLst>
+          </p:cNvPr>
+          <p:cNvPicPr>
+            <a:picLocks noChangeAspect="1"/>
+          </p:cNvPicPr>
+          <p:nvPr/>
+        </p:nvPicPr>
+        <p:blipFill>
+          <a:blip r:embed="rId3"/>
+          <a:stretch>
+            <a:fillRect/>
+          </a:stretch>
+        </p:blipFill>
+        <p:spPr>
+          <a:xfrm>
+            <a:off x="4672103" y="3696034"/>
+            <a:ext cx="6883071" cy="2185375"/>
+          </a:xfrm>
+          <a:prstGeom prst="rect">
+            <a:avLst/>
+          </a:prstGeom>
+          <a:ln w="31750" cap="sq">
+            <a:solidFill>
+              <a:srgbClr val="FFFFFF"/>
+            </a:solidFill>
+            <a:miter lim="800000"/>
+          </a:ln>
+        </p:spPr>
+      </p:pic>
+    </p:spTree>
+    <p:extLst>
+      <p:ext uri="{BB962C8B-B14F-4D97-AF65-F5344CB8AC3E}">
+        <p14:creationId xmlns:p14="http://schemas.microsoft.com/office/powerpoint/2010/main" val="4172150890"/>
+      </p:ext>
+    </p:extLst>
+  </p:cSld>
+  <p:clrMapOvr>
+    <a:masterClrMapping/>
+  </p:clrMapOvr>
+</p:sld>
+</file>
+
+<file path=ppt/slides/slide4.xml><?xml version="1.0" encoding="utf-8"?>
+<p:sld xmlns:a="http://schemas.openxmlformats.org/drawingml/2006/main" xmlns:r="http://schemas.openxmlformats.org/officeDocument/2006/relationships" xmlns:p="http://schemas.openxmlformats.org/presentationml/2006/main">
+  <p:cSld>
+    <p:bg>
+      <p:bgPr>
+        <a:solidFill>
+          <a:schemeClr val="bg1">
+            <a:lumMod val="95000"/>
+          </a:schemeClr>
+        </a:solidFill>
+        <a:effectLst/>
+      </p:bgPr>
+    </p:bg>
+    <p:spTree>
+      <p:nvGrpSpPr>
+        <p:cNvPr id="1" name=""/>
+        <p:cNvGrpSpPr/>
+        <p:nvPr/>
+      </p:nvGrpSpPr>
+      <p:grpSpPr>
+        <a:xfrm>
+          <a:off x="0" y="0"/>
+          <a:ext cx="0" cy="0"/>
+          <a:chOff x="0" y="0"/>
+          <a:chExt cx="0" cy="0"/>
+        </a:xfrm>
+      </p:grpSpPr>
+      <p:sp>
+        <p:nvSpPr>
+          <p:cNvPr id="2" name="Title 1">
+            <a:extLst>
+              <a:ext uri="{FF2B5EF4-FFF2-40B4-BE49-F238E27FC236}">
                 <a16:creationId xmlns:a16="http://schemas.microsoft.com/office/drawing/2014/main" id="{E92A2896-7C5B-4985-9F15-7FD3BF144C54}"/>
               </a:ext>
             </a:extLst>
@@ -4203,7 +4809,7 @@
           <a:p>
             <a:r>
               <a:rPr lang="en-US" dirty="0"/>
-              <a:t>Working with ros topics </a:t>
+              <a:t>publisher</a:t>
             </a:r>
             <a:br>
               <a:rPr lang="en-US" dirty="0"/>
@@ -4456,7 +5062,7 @@
 </p:sld>
 </file>
 
-<file path=ppt/slides/slide4.xml><?xml version="1.0" encoding="utf-8"?>
+<file path=ppt/slides/slide5.xml><?xml version="1.0" encoding="utf-8"?>
 <p:sld xmlns:a="http://schemas.openxmlformats.org/drawingml/2006/main" xmlns:r="http://schemas.openxmlformats.org/officeDocument/2006/relationships" xmlns:p="http://schemas.openxmlformats.org/presentationml/2006/main">
   <p:cSld>
     <p:bg>
@@ -4513,7 +5119,7 @@
           <a:p>
             <a:r>
               <a:rPr lang="en-US" dirty="0"/>
-              <a:t>Working with ros topics </a:t>
+              <a:t>Subscriber </a:t>
             </a:r>
             <a:br>
               <a:rPr lang="en-US" dirty="0"/>
@@ -4773,417 +5379,6 @@
 </p:sld>
 </file>
 
-<file path=ppt/slides/slide5.xml><?xml version="1.0" encoding="utf-8"?>
-<p:sld xmlns:a="http://schemas.openxmlformats.org/drawingml/2006/main" xmlns:r="http://schemas.openxmlformats.org/officeDocument/2006/relationships" xmlns:p="http://schemas.openxmlformats.org/presentationml/2006/main">
-  <p:cSld>
-    <p:spTree>
-      <p:nvGrpSpPr>
-        <p:cNvPr id="1" name=""/>
-        <p:cNvGrpSpPr/>
-        <p:nvPr/>
-      </p:nvGrpSpPr>
-      <p:grpSpPr>
-        <a:xfrm>
-          <a:off x="0" y="0"/>
-          <a:ext cx="0" cy="0"/>
-          <a:chOff x="0" y="0"/>
-          <a:chExt cx="0" cy="0"/>
-        </a:xfrm>
-      </p:grpSpPr>
-      <p:sp>
-        <p:nvSpPr>
-          <p:cNvPr id="2" name="Title 1">
-            <a:extLst>
-              <a:ext uri="{FF2B5EF4-FFF2-40B4-BE49-F238E27FC236}">
-                <a16:creationId xmlns:a16="http://schemas.microsoft.com/office/drawing/2014/main" id="{F69B0995-B500-4920-B8F6-4091DBE8E2FD}"/>
-              </a:ext>
-            </a:extLst>
-          </p:cNvPr>
-          <p:cNvSpPr>
-            <a:spLocks noGrp="1"/>
-          </p:cNvSpPr>
-          <p:nvPr>
-            <p:ph type="title"/>
-          </p:nvPr>
-        </p:nvSpPr>
-        <p:spPr/>
-        <p:txBody>
-          <a:bodyPr/>
-          <a:lstStyle/>
-          <a:p>
-            <a:r>
-              <a:rPr lang="en-US" dirty="0"/>
-              <a:t>Working with ros topics </a:t>
-            </a:r>
-            <a:br>
-              <a:rPr lang="en-US" dirty="0"/>
-            </a:br>
-            <a:r>
-              <a:rPr lang="en-US" dirty="0"/>
-              <a:t>(standard messages)</a:t>
-            </a:r>
-          </a:p>
-        </p:txBody>
-      </p:sp>
-      <p:sp>
-        <p:nvSpPr>
-          <p:cNvPr id="3" name="Content Placeholder 2">
-            <a:extLst>
-              <a:ext uri="{FF2B5EF4-FFF2-40B4-BE49-F238E27FC236}">
-                <a16:creationId xmlns:a16="http://schemas.microsoft.com/office/drawing/2014/main" id="{D7EE5121-4FA4-41EC-8676-F12961AD89C8}"/>
-              </a:ext>
-            </a:extLst>
-          </p:cNvPr>
-          <p:cNvSpPr>
-            <a:spLocks noGrp="1"/>
-          </p:cNvSpPr>
-          <p:nvPr>
-            <p:ph idx="1"/>
-          </p:nvPr>
-        </p:nvSpPr>
-        <p:spPr/>
-        <p:txBody>
-          <a:bodyPr/>
-          <a:lstStyle/>
-          <a:p>
-            <a:r>
-              <a:rPr lang="en-US" dirty="0"/>
-              <a:t>To build and compile the nodes we have just written, we have to add (or uncomment) a few things to the CMakeList.txt file.</a:t>
-            </a:r>
-          </a:p>
-          <a:p>
-            <a:pPr lvl="1"/>
-            <a:r>
-              <a:rPr lang="en-US" altLang="en-US" dirty="0" err="1">
-                <a:solidFill>
-                  <a:srgbClr val="333333"/>
-                </a:solidFill>
-                <a:latin typeface="Courier New" panose="02070309020205020404" pitchFamily="49" charset="0"/>
-                <a:cs typeface="Courier New" panose="02070309020205020404" pitchFamily="49" charset="0"/>
-              </a:rPr>
-              <a:t>find_package</a:t>
-            </a:r>
-            <a:r>
-              <a:rPr lang="en-US" altLang="en-US" dirty="0">
-                <a:solidFill>
-                  <a:srgbClr val="333333"/>
-                </a:solidFill>
-                <a:latin typeface="Courier New" panose="02070309020205020404" pitchFamily="49" charset="0"/>
-                <a:cs typeface="Courier New" panose="02070309020205020404" pitchFamily="49" charset="0"/>
-              </a:rPr>
-              <a:t>(catkin REQUIRED COMPONENTS roscpp std_msgs </a:t>
-            </a:r>
-            <a:r>
-              <a:rPr lang="en-US" altLang="en-US" dirty="0" err="1">
-                <a:solidFill>
-                  <a:srgbClr val="333333"/>
-                </a:solidFill>
-                <a:latin typeface="Courier New" panose="02070309020205020404" pitchFamily="49" charset="0"/>
-                <a:cs typeface="Courier New" panose="02070309020205020404" pitchFamily="49" charset="0"/>
-              </a:rPr>
-              <a:t>genmsg</a:t>
-            </a:r>
-            <a:r>
-              <a:rPr lang="en-US" altLang="en-US" dirty="0">
-                <a:solidFill>
-                  <a:srgbClr val="333333"/>
-                </a:solidFill>
-                <a:latin typeface="Courier New" panose="02070309020205020404" pitchFamily="49" charset="0"/>
-                <a:cs typeface="Courier New" panose="02070309020205020404" pitchFamily="49" charset="0"/>
-              </a:rPr>
-              <a:t>)</a:t>
-            </a:r>
-          </a:p>
-          <a:p>
-            <a:pPr lvl="1"/>
-            <a:r>
-              <a:rPr lang="en-US" altLang="en-US" dirty="0" err="1">
-                <a:solidFill>
-                  <a:srgbClr val="333333"/>
-                </a:solidFill>
-                <a:latin typeface="Courier New" panose="02070309020205020404" pitchFamily="49" charset="0"/>
-                <a:cs typeface="Courier New" panose="02070309020205020404" pitchFamily="49" charset="0"/>
-              </a:rPr>
-              <a:t>generate_messages</a:t>
-            </a:r>
-            <a:r>
-              <a:rPr lang="en-US" altLang="en-US" dirty="0">
-                <a:solidFill>
-                  <a:srgbClr val="333333"/>
-                </a:solidFill>
-                <a:latin typeface="Courier New" panose="02070309020205020404" pitchFamily="49" charset="0"/>
-                <a:cs typeface="Courier New" panose="02070309020205020404" pitchFamily="49" charset="0"/>
-              </a:rPr>
-              <a:t>(DEPENDENIES std_msgs)</a:t>
-            </a:r>
-          </a:p>
-          <a:p>
-            <a:pPr lvl="1"/>
-            <a:r>
-              <a:rPr lang="en-US" altLang="en-US" dirty="0" err="1">
-                <a:solidFill>
-                  <a:srgbClr val="333333"/>
-                </a:solidFill>
-                <a:latin typeface="Courier New" panose="02070309020205020404" pitchFamily="49" charset="0"/>
-                <a:cs typeface="Courier New" panose="02070309020205020404" pitchFamily="49" charset="0"/>
-              </a:rPr>
-              <a:t>catkin_package</a:t>
-            </a:r>
-            <a:r>
-              <a:rPr lang="en-US" altLang="en-US" dirty="0">
-                <a:solidFill>
-                  <a:srgbClr val="333333"/>
-                </a:solidFill>
-                <a:latin typeface="Courier New" panose="02070309020205020404" pitchFamily="49" charset="0"/>
-                <a:cs typeface="Courier New" panose="02070309020205020404" pitchFamily="49" charset="0"/>
-              </a:rPr>
-              <a:t>()</a:t>
-            </a:r>
-          </a:p>
-          <a:p>
-            <a:pPr lvl="1"/>
-            <a:r>
-              <a:rPr lang="en-US" altLang="en-US" dirty="0" err="1">
-                <a:solidFill>
-                  <a:srgbClr val="333333"/>
-                </a:solidFill>
-                <a:latin typeface="Courier New" panose="02070309020205020404" pitchFamily="49" charset="0"/>
-                <a:cs typeface="Courier New" panose="02070309020205020404" pitchFamily="49" charset="0"/>
-              </a:rPr>
-              <a:t>Include_directories</a:t>
-            </a:r>
-            <a:r>
-              <a:rPr lang="en-US" altLang="en-US" dirty="0">
-                <a:solidFill>
-                  <a:srgbClr val="333333"/>
-                </a:solidFill>
-                <a:latin typeface="Courier New" panose="02070309020205020404" pitchFamily="49" charset="0"/>
-                <a:cs typeface="Courier New" panose="02070309020205020404" pitchFamily="49" charset="0"/>
-              </a:rPr>
-              <a:t>(include ${</a:t>
-            </a:r>
-            <a:r>
-              <a:rPr lang="en-US" altLang="en-US" dirty="0" err="1">
-                <a:solidFill>
-                  <a:srgbClr val="333333"/>
-                </a:solidFill>
-                <a:latin typeface="Courier New" panose="02070309020205020404" pitchFamily="49" charset="0"/>
-                <a:cs typeface="Courier New" panose="02070309020205020404" pitchFamily="49" charset="0"/>
-              </a:rPr>
-              <a:t>catkin_INCLUDE_DIRS</a:t>
-            </a:r>
-            <a:r>
-              <a:rPr lang="en-US" altLang="en-US" dirty="0">
-                <a:solidFill>
-                  <a:srgbClr val="333333"/>
-                </a:solidFill>
-                <a:latin typeface="Courier New" panose="02070309020205020404" pitchFamily="49" charset="0"/>
-                <a:cs typeface="Courier New" panose="02070309020205020404" pitchFamily="49" charset="0"/>
-              </a:rPr>
-              <a:t>})</a:t>
-            </a:r>
-            <a:endParaRPr lang="en-US" altLang="en-US" dirty="0">
-              <a:solidFill>
-                <a:schemeClr val="tx1"/>
-              </a:solidFill>
-              <a:latin typeface="Courier New" panose="02070309020205020404" pitchFamily="49" charset="0"/>
-              <a:cs typeface="Courier New" panose="02070309020205020404" pitchFamily="49" charset="0"/>
-            </a:endParaRPr>
-          </a:p>
-        </p:txBody>
-      </p:sp>
-      <p:sp>
-        <p:nvSpPr>
-          <p:cNvPr id="4" name="Rectangle 1">
-            <a:extLst>
-              <a:ext uri="{FF2B5EF4-FFF2-40B4-BE49-F238E27FC236}">
-                <a16:creationId xmlns:a16="http://schemas.microsoft.com/office/drawing/2014/main" id="{9F39AC38-FD2D-41F0-921C-5F60E497D4A8}"/>
-              </a:ext>
-            </a:extLst>
-          </p:cNvPr>
-          <p:cNvSpPr>
-            <a:spLocks noChangeArrowheads="1"/>
-          </p:cNvSpPr>
-          <p:nvPr/>
-        </p:nvSpPr>
-        <p:spPr bwMode="auto">
-          <a:xfrm>
-            <a:off x="0" y="0"/>
-            <a:ext cx="12192000" cy="457200"/>
-          </a:xfrm>
-          <a:prstGeom prst="rect">
-            <a:avLst/>
-          </a:prstGeom>
-          <a:solidFill>
-            <a:srgbClr val="F3F5F7"/>
-          </a:solidFill>
-          <a:ln>
-            <a:noFill/>
-          </a:ln>
-          <a:effectLst/>
-          <a:extLst>
-            <a:ext uri="{91240B29-F687-4F45-9708-019B960494DF}">
-              <a14:hiddenLine xmlns:a14="http://schemas.microsoft.com/office/drawing/2010/main" w="9525">
-                <a:solidFill>
-                  <a:schemeClr val="tx1"/>
-                </a:solidFill>
-                <a:miter lim="800000"/>
-                <a:headEnd/>
-                <a:tailEnd/>
-              </a14:hiddenLine>
-            </a:ext>
-            <a:ext uri="{AF507438-7753-43E0-B8FC-AC1667EBCBE1}">
-              <a14:hiddenEffects xmlns:a14="http://schemas.microsoft.com/office/drawing/2010/main">
-                <a:effectLst>
-                  <a:outerShdw dist="35921" dir="2700000" algn="ctr" rotWithShape="0">
-                    <a:schemeClr val="bg2"/>
-                  </a:outerShdw>
-                </a:effectLst>
-              </a14:hiddenEffects>
-            </a:ext>
-          </a:extLst>
-        </p:spPr>
-        <p:txBody>
-          <a:bodyPr vert="horz" wrap="none" lIns="0" tIns="0" rIns="0" bIns="0" numCol="1" anchor="ctr" anchorCtr="0" compatLnSpc="1">
-            <a:prstTxWarp prst="textNoShape">
-              <a:avLst/>
-            </a:prstTxWarp>
-            <a:spAutoFit/>
-          </a:bodyPr>
-          <a:lstStyle/>
-          <a:p>
-            <a:pPr marL="0" marR="0" lvl="0" indent="0" algn="l" defTabSz="914400" rtl="0" eaLnBrk="0" fontAlgn="base" latinLnBrk="0" hangingPunct="0">
-              <a:lnSpc>
-                <a:spcPct val="100000"/>
-              </a:lnSpc>
-              <a:spcBef>
-                <a:spcPct val="0"/>
-              </a:spcBef>
-              <a:spcAft>
-                <a:spcPct val="0"/>
-              </a:spcAft>
-              <a:buClrTx/>
-              <a:buSzTx/>
-              <a:buFontTx/>
-              <a:buNone/>
-              <a:tabLst/>
-            </a:pPr>
-            <a:r>
-              <a:rPr kumimoji="0" lang="en-US" altLang="en-US" sz="900" b="0" i="0" u="none" strike="noStrike" cap="none" normalizeH="0" baseline="0" dirty="0" err="1">
-                <a:ln>
-                  <a:noFill/>
-                </a:ln>
-                <a:solidFill>
-                  <a:srgbClr val="333333"/>
-                </a:solidFill>
-                <a:effectLst/>
-                <a:latin typeface="courier"/>
-              </a:rPr>
-              <a:t>find_package</a:t>
-            </a:r>
-            <a:r>
-              <a:rPr kumimoji="0" lang="en-US" altLang="en-US" sz="900" b="0" i="0" u="none" strike="noStrike" cap="none" normalizeH="0" baseline="0" dirty="0">
-                <a:ln>
-                  <a:noFill/>
-                </a:ln>
-                <a:solidFill>
-                  <a:srgbClr val="333333"/>
-                </a:solidFill>
-                <a:effectLst/>
-                <a:latin typeface="courier"/>
-              </a:rPr>
-              <a:t>(catkin REQUIRED COMPONENTS roscpp </a:t>
-            </a:r>
-            <a:r>
-              <a:rPr kumimoji="0" lang="en-US" altLang="en-US" sz="900" b="0" i="0" u="none" strike="noStrike" cap="none" normalizeH="0" baseline="0" dirty="0" err="1">
-                <a:ln>
-                  <a:noFill/>
-                </a:ln>
-                <a:solidFill>
-                  <a:srgbClr val="333333"/>
-                </a:solidFill>
-                <a:effectLst/>
-                <a:latin typeface="courier"/>
-              </a:rPr>
-              <a:t>rospy</a:t>
-            </a:r>
-            <a:r>
-              <a:rPr kumimoji="0" lang="en-US" altLang="en-US" sz="900" b="0" i="0" u="none" strike="noStrike" cap="none" normalizeH="0" baseline="0" dirty="0">
-                <a:ln>
-                  <a:noFill/>
-                </a:ln>
-                <a:solidFill>
-                  <a:srgbClr val="333333"/>
-                </a:solidFill>
-                <a:effectLst/>
-                <a:latin typeface="courier"/>
-              </a:rPr>
-              <a:t> std_msgs </a:t>
-            </a:r>
-            <a:r>
-              <a:rPr kumimoji="0" lang="en-US" altLang="en-US" sz="900" b="0" i="0" u="none" strike="noStrike" cap="none" normalizeH="0" baseline="0" dirty="0" err="1">
-                <a:ln>
-                  <a:noFill/>
-                </a:ln>
-                <a:solidFill>
-                  <a:srgbClr val="333333"/>
-                </a:solidFill>
-                <a:effectLst/>
-                <a:latin typeface="courier"/>
-              </a:rPr>
-              <a:t>genmsg</a:t>
-            </a:r>
-            <a:r>
-              <a:rPr kumimoji="0" lang="en-US" altLang="en-US" sz="900" b="0" i="0" u="none" strike="noStrike" cap="none" normalizeH="0" baseline="0" dirty="0">
-                <a:ln>
-                  <a:noFill/>
-                </a:ln>
-                <a:solidFill>
-                  <a:srgbClr val="333333"/>
-                </a:solidFill>
-                <a:effectLst/>
-                <a:latin typeface="courier"/>
-              </a:rPr>
-              <a:t>)</a:t>
-            </a:r>
-            <a:r>
-              <a:rPr kumimoji="0" lang="en-US" altLang="en-US" sz="800" b="0" i="0" u="none" strike="noStrike" cap="none" normalizeH="0" baseline="0" dirty="0">
-                <a:ln>
-                  <a:noFill/>
-                </a:ln>
-                <a:solidFill>
-                  <a:schemeClr val="tx1"/>
-                </a:solidFill>
-                <a:effectLst/>
-              </a:rPr>
-              <a:t> </a:t>
-            </a:r>
-            <a:endParaRPr kumimoji="0" lang="en-US" altLang="en-US" sz="1800" b="0" i="0" u="none" strike="noStrike" cap="none" normalizeH="0" baseline="0" dirty="0">
-              <a:ln>
-                <a:noFill/>
-              </a:ln>
-              <a:solidFill>
-                <a:schemeClr val="tx1"/>
-              </a:solidFill>
-              <a:effectLst/>
-              <a:latin typeface="Arial" panose="020B0604020202020204" pitchFamily="34" charset="0"/>
-            </a:endParaRPr>
-          </a:p>
-        </p:txBody>
-      </p:sp>
-    </p:spTree>
-    <p:extLst>
-      <p:ext uri="{BB962C8B-B14F-4D97-AF65-F5344CB8AC3E}">
-        <p14:creationId xmlns:p14="http://schemas.microsoft.com/office/powerpoint/2010/main" val="1256453299"/>
-      </p:ext>
-    </p:extLst>
-  </p:cSld>
-  <p:clrMapOvr>
-    <a:masterClrMapping/>
-  </p:clrMapOvr>
-</p:sld>
-</file>
-
 <file path=ppt/slides/slide6.xml><?xml version="1.0" encoding="utf-8"?>
 <p:sld xmlns:a="http://schemas.openxmlformats.org/drawingml/2006/main" xmlns:r="http://schemas.openxmlformats.org/officeDocument/2006/relationships" xmlns:p="http://schemas.openxmlformats.org/presentationml/2006/main">
   <p:cSld>
@@ -5206,7 +5401,7 @@
           <p:cNvPr id="2" name="Title 1">
             <a:extLst>
               <a:ext uri="{FF2B5EF4-FFF2-40B4-BE49-F238E27FC236}">
-                <a16:creationId xmlns:a16="http://schemas.microsoft.com/office/drawing/2014/main" id="{5FAF2520-5663-47CE-99FB-90A7E270BC40}"/>
+                <a16:creationId xmlns:a16="http://schemas.microsoft.com/office/drawing/2014/main" id="{F69B0995-B500-4920-B8F6-4091DBE8E2FD}"/>
               </a:ext>
             </a:extLst>
           </p:cNvPr>
@@ -5241,7 +5436,7 @@
           <p:cNvPr id="3" name="Content Placeholder 2">
             <a:extLst>
               <a:ext uri="{FF2B5EF4-FFF2-40B4-BE49-F238E27FC236}">
-                <a16:creationId xmlns:a16="http://schemas.microsoft.com/office/drawing/2014/main" id="{1ABC825A-34A7-42F9-80DC-B943FF7068A3}"/>
+                <a16:creationId xmlns:a16="http://schemas.microsoft.com/office/drawing/2014/main" id="{D7EE5121-4FA4-41EC-8676-F12961AD89C8}"/>
               </a:ext>
             </a:extLst>
           </p:cNvPr>
@@ -5254,133 +5449,151 @@
         </p:nvSpPr>
         <p:spPr/>
         <p:txBody>
-          <a:bodyPr/>
-          <a:lstStyle/>
-          <a:p>
-            <a:r>
-              <a:rPr lang="en-US" dirty="0"/>
-              <a:t>For each node we have created, we will add the following (we will use the publisher node as an example):</a:t>
+          <a:bodyPr>
+            <a:normAutofit fontScale="77500" lnSpcReduction="20000"/>
+          </a:bodyPr>
+          <a:lstStyle/>
+          <a:p>
+            <a:r>
+              <a:rPr lang="en-US" dirty="0"/>
+              <a:t>To build and compile the nodes we have just written, we have to add (or uncomment) a few things to the CMakeList.txt file.</a:t>
             </a:r>
           </a:p>
           <a:p>
             <a:pPr lvl="1"/>
             <a:r>
-              <a:rPr lang="en-US" dirty="0" err="1">
+              <a:rPr lang="en-US" altLang="en-US" dirty="0">
+                <a:solidFill>
+                  <a:srgbClr val="333333"/>
+                </a:solidFill>
                 <a:latin typeface="Courier New" panose="02070309020205020404" pitchFamily="49" charset="0"/>
                 <a:cs typeface="Courier New" panose="02070309020205020404" pitchFamily="49" charset="0"/>
               </a:rPr>
-              <a:t>add_executable</a:t>
-            </a:r>
-            <a:r>
-              <a:rPr lang="en-US" dirty="0">
+              <a:t>find_package(catkin REQUIRED COMPONENTS roscpp std_msgs message_generation)</a:t>
+            </a:r>
+          </a:p>
+          <a:p>
+            <a:pPr lvl="1"/>
+            <a:r>
+              <a:rPr lang="en-US" altLang="en-US" dirty="0">
+                <a:solidFill>
+                  <a:srgbClr val="333333"/>
+                </a:solidFill>
                 <a:latin typeface="Courier New" panose="02070309020205020404" pitchFamily="49" charset="0"/>
                 <a:cs typeface="Courier New" panose="02070309020205020404" pitchFamily="49" charset="0"/>
               </a:rPr>
-              <a:t>(</a:t>
-            </a:r>
-            <a:r>
-              <a:rPr lang="en-US" dirty="0" err="1">
+              <a:t>generate_messages(DEPENDENIES std_msgs)</a:t>
+            </a:r>
+          </a:p>
+          <a:p>
+            <a:pPr lvl="1"/>
+            <a:r>
+              <a:rPr lang="en-US" altLang="en-US" dirty="0">
+                <a:solidFill>
+                  <a:srgbClr val="333333"/>
+                </a:solidFill>
                 <a:latin typeface="Courier New" panose="02070309020205020404" pitchFamily="49" charset="0"/>
                 <a:cs typeface="Courier New" panose="02070309020205020404" pitchFamily="49" charset="0"/>
               </a:rPr>
-              <a:t>simple_publisher</a:t>
-            </a:r>
-            <a:r>
-              <a:rPr lang="en-US" dirty="0">
+              <a:t>catkin_package()</a:t>
+            </a:r>
+          </a:p>
+          <a:p>
+            <a:pPr lvl="1"/>
+            <a:r>
+              <a:rPr lang="en-US" altLang="en-US" dirty="0">
+                <a:solidFill>
+                  <a:srgbClr val="333333"/>
+                </a:solidFill>
                 <a:latin typeface="Courier New" panose="02070309020205020404" pitchFamily="49" charset="0"/>
                 <a:cs typeface="Courier New" panose="02070309020205020404" pitchFamily="49" charset="0"/>
               </a:rPr>
-              <a:t> src/simple_publisher.cpp)</a:t>
+              <a:t>include_directories(include ${catkin_INCLUDE_DIRS})</a:t>
+            </a:r>
+          </a:p>
+          <a:p>
+            <a:r>
+              <a:rPr lang="en-US" altLang="en-US" dirty="0"/>
+              <a:t>Add the following to the package.xml file</a:t>
             </a:r>
           </a:p>
           <a:p>
             <a:pPr lvl="1"/>
             <a:r>
-              <a:rPr lang="en-US" dirty="0" err="1">
+              <a:rPr lang="en-US" altLang="en-US" dirty="0">
+                <a:solidFill>
+                  <a:srgbClr val="333333"/>
+                </a:solidFill>
                 <a:latin typeface="Courier New" panose="02070309020205020404" pitchFamily="49" charset="0"/>
                 <a:cs typeface="Courier New" panose="02070309020205020404" pitchFamily="49" charset="0"/>
               </a:rPr>
-              <a:t>target_link_libraries</a:t>
-            </a:r>
-            <a:r>
-              <a:rPr lang="en-US" dirty="0">
+              <a:t>&lt;build_depend&gt;roscpp&lt;/build_depend&gt;</a:t>
+            </a:r>
+            <a:br>
+              <a:rPr lang="en-US" altLang="en-US" dirty="0">
+                <a:solidFill>
+                  <a:srgbClr val="333333"/>
+                </a:solidFill>
                 <a:latin typeface="Courier New" panose="02070309020205020404" pitchFamily="49" charset="0"/>
                 <a:cs typeface="Courier New" panose="02070309020205020404" pitchFamily="49" charset="0"/>
               </a:rPr>
-              <a:t>(</a:t>
-            </a:r>
-            <a:r>
-              <a:rPr lang="en-US" dirty="0" err="1">
+            </a:br>
+            <a:r>
+              <a:rPr lang="en-US" altLang="en-US" dirty="0">
+                <a:solidFill>
+                  <a:srgbClr val="333333"/>
+                </a:solidFill>
                 <a:latin typeface="Courier New" panose="02070309020205020404" pitchFamily="49" charset="0"/>
                 <a:cs typeface="Courier New" panose="02070309020205020404" pitchFamily="49" charset="0"/>
               </a:rPr>
-              <a:t>simple_publisher</a:t>
-            </a:r>
-            <a:r>
-              <a:rPr lang="en-US" dirty="0">
+              <a:t>&lt;run_depend&gt;roscpp&lt;/run_depend&gt;</a:t>
+            </a:r>
+            <a:br>
+              <a:rPr lang="en-US" altLang="en-US" dirty="0">
+                <a:solidFill>
+                  <a:srgbClr val="333333"/>
+                </a:solidFill>
                 <a:latin typeface="Courier New" panose="02070309020205020404" pitchFamily="49" charset="0"/>
                 <a:cs typeface="Courier New" panose="02070309020205020404" pitchFamily="49" charset="0"/>
               </a:rPr>
-              <a:t> ${</a:t>
-            </a:r>
-            <a:r>
-              <a:rPr lang="en-US" dirty="0" err="1">
+            </a:br>
+            <a:br>
+              <a:rPr lang="en-US" altLang="en-US" dirty="0">
+                <a:solidFill>
+                  <a:srgbClr val="333333"/>
+                </a:solidFill>
                 <a:latin typeface="Courier New" panose="02070309020205020404" pitchFamily="49" charset="0"/>
                 <a:cs typeface="Courier New" panose="02070309020205020404" pitchFamily="49" charset="0"/>
               </a:rPr>
-              <a:t>catkin_LIBRARIES</a:t>
-            </a:r>
-            <a:r>
-              <a:rPr lang="en-US" dirty="0">
+            </a:br>
+            <a:r>
+              <a:rPr lang="en-US" altLang="en-US" dirty="0">
+                <a:solidFill>
+                  <a:srgbClr val="333333"/>
+                </a:solidFill>
                 <a:latin typeface="Courier New" panose="02070309020205020404" pitchFamily="49" charset="0"/>
                 <a:cs typeface="Courier New" panose="02070309020205020404" pitchFamily="49" charset="0"/>
               </a:rPr>
-              <a:t>})</a:t>
-            </a:r>
-          </a:p>
-          <a:p>
-            <a:pPr lvl="1"/>
-            <a:r>
-              <a:rPr lang="en-US" dirty="0" err="1">
+              <a:t>&lt;build_depend&gt;message_generation&lt;/build_depend&gt; </a:t>
+            </a:r>
+            <a:br>
+              <a:rPr lang="en-US" altLang="en-US" dirty="0">
+                <a:solidFill>
+                  <a:srgbClr val="333333"/>
+                </a:solidFill>
                 <a:latin typeface="Courier New" panose="02070309020205020404" pitchFamily="49" charset="0"/>
                 <a:cs typeface="Courier New" panose="02070309020205020404" pitchFamily="49" charset="0"/>
               </a:rPr>
-              <a:t>add_dependencies</a:t>
-            </a:r>
-            <a:r>
-              <a:rPr lang="en-US" dirty="0">
+            </a:br>
+            <a:r>
+              <a:rPr lang="en-US" altLang="en-US" dirty="0">
+                <a:solidFill>
+                  <a:srgbClr val="333333"/>
+                </a:solidFill>
                 <a:latin typeface="Courier New" panose="02070309020205020404" pitchFamily="49" charset="0"/>
                 <a:cs typeface="Courier New" panose="02070309020205020404" pitchFamily="49" charset="0"/>
               </a:rPr>
-              <a:t>(</a:t>
-            </a:r>
-            <a:r>
-              <a:rPr lang="en-US" dirty="0" err="1">
-                <a:latin typeface="Courier New" panose="02070309020205020404" pitchFamily="49" charset="0"/>
-                <a:cs typeface="Courier New" panose="02070309020205020404" pitchFamily="49" charset="0"/>
-              </a:rPr>
-              <a:t>simple_publisher</a:t>
-            </a:r>
-            <a:r>
-              <a:rPr lang="en-US" dirty="0">
-                <a:latin typeface="Courier New" panose="02070309020205020404" pitchFamily="49" charset="0"/>
-                <a:cs typeface="Courier New" panose="02070309020205020404" pitchFamily="49" charset="0"/>
-              </a:rPr>
-              <a:t> ${PROJECT_NAME}_</a:t>
-            </a:r>
-            <a:r>
-              <a:rPr lang="en-US" dirty="0" err="1">
-                <a:latin typeface="Courier New" panose="02070309020205020404" pitchFamily="49" charset="0"/>
-                <a:cs typeface="Courier New" panose="02070309020205020404" pitchFamily="49" charset="0"/>
-              </a:rPr>
-              <a:t>generate_message_cpp</a:t>
-            </a:r>
-            <a:r>
-              <a:rPr lang="en-US" dirty="0">
-                <a:latin typeface="Courier New" panose="02070309020205020404" pitchFamily="49" charset="0"/>
-                <a:cs typeface="Courier New" panose="02070309020205020404" pitchFamily="49" charset="0"/>
-              </a:rPr>
-              <a:t>)</a:t>
+              <a:t>&lt;run_depend&gt;message_runtime&lt;/run_depend&gt; </a:t>
             </a:r>
           </a:p>
         </p:txBody>
@@ -5388,7 +5601,7 @@
     </p:spTree>
     <p:extLst>
       <p:ext uri="{BB962C8B-B14F-4D97-AF65-F5344CB8AC3E}">
-        <p14:creationId xmlns:p14="http://schemas.microsoft.com/office/powerpoint/2010/main" val="4206895970"/>
+        <p14:creationId xmlns:p14="http://schemas.microsoft.com/office/powerpoint/2010/main" val="1256453299"/>
       </p:ext>
     </p:extLst>
   </p:cSld>
@@ -5420,7 +5633,7 @@
           <p:cNvPr id="2" name="Title 1">
             <a:extLst>
               <a:ext uri="{FF2B5EF4-FFF2-40B4-BE49-F238E27FC236}">
-                <a16:creationId xmlns:a16="http://schemas.microsoft.com/office/drawing/2014/main" id="{0D8ED408-33D1-4390-B266-9B01B97B73D9}"/>
+                <a16:creationId xmlns:a16="http://schemas.microsoft.com/office/drawing/2014/main" id="{5FAF2520-5663-47CE-99FB-90A7E270BC40}"/>
               </a:ext>
             </a:extLst>
           </p:cNvPr>
@@ -5431,7 +5644,12 @@
             <p:ph type="title"/>
           </p:nvPr>
         </p:nvSpPr>
-        <p:spPr/>
+        <p:spPr>
+          <a:xfrm>
+            <a:off x="2231136" y="964692"/>
+            <a:ext cx="7729728" cy="1188720"/>
+          </a:xfrm>
+        </p:spPr>
         <p:txBody>
           <a:bodyPr/>
           <a:lstStyle/>
@@ -5455,7 +5673,7 @@
           <p:cNvPr id="3" name="Content Placeholder 2">
             <a:extLst>
               <a:ext uri="{FF2B5EF4-FFF2-40B4-BE49-F238E27FC236}">
-                <a16:creationId xmlns:a16="http://schemas.microsoft.com/office/drawing/2014/main" id="{AEDB433D-A6FD-4430-B437-024500F92F6D}"/>
+                <a16:creationId xmlns:a16="http://schemas.microsoft.com/office/drawing/2014/main" id="{1ABC825A-34A7-42F9-80DC-B943FF7068A3}"/>
               </a:ext>
             </a:extLst>
           </p:cNvPr>
@@ -5468,107 +5686,100 @@
         </p:nvSpPr>
         <p:spPr/>
         <p:txBody>
-          <a:bodyPr>
-            <a:normAutofit fontScale="92500" lnSpcReduction="10000"/>
-          </a:bodyPr>
-          <a:lstStyle/>
-          <a:p>
-            <a:r>
-              <a:rPr lang="en-US" dirty="0"/>
-              <a:t>After having finished all the modifications to the CMakeList.txt, all that’s left is to build and test the nodes.</a:t>
-            </a:r>
-          </a:p>
-          <a:p>
-            <a:r>
-              <a:rPr lang="en-US" dirty="0"/>
-              <a:t>Build the package with: </a:t>
+          <a:bodyPr/>
+          <a:lstStyle/>
+          <a:p>
+            <a:r>
+              <a:rPr lang="en-US" dirty="0"/>
+              <a:t>For each node we have created, we will add the following (we will use the publisher node as an example):</a:t>
             </a:r>
           </a:p>
           <a:p>
             <a:pPr lvl="1"/>
-            <a:r>
-              <a:rPr lang="en-US" dirty="0"/>
-              <a:t>$ </a:t>
-            </a:r>
             <a:r>
               <a:rPr lang="en-US" dirty="0">
                 <a:latin typeface="Courier New" panose="02070309020205020404" pitchFamily="49" charset="0"/>
                 <a:cs typeface="Courier New" panose="02070309020205020404" pitchFamily="49" charset="0"/>
               </a:rPr>
-              <a:t>cd ~/catkin_ws</a:t>
-            </a:r>
-          </a:p>
-          <a:p>
-            <a:pPr lvl="1"/>
-            <a:r>
-              <a:rPr lang="en-US" dirty="0"/>
-              <a:t>$ </a:t>
+              <a:t>add_executable(</a:t>
+            </a:r>
+            <a:r>
+              <a:rPr lang="en-US" dirty="0" err="1">
+                <a:latin typeface="Courier New" panose="02070309020205020404" pitchFamily="49" charset="0"/>
+                <a:cs typeface="Courier New" panose="02070309020205020404" pitchFamily="49" charset="0"/>
+              </a:rPr>
+              <a:t>simple_publisher</a:t>
             </a:r>
             <a:r>
               <a:rPr lang="en-US" dirty="0">
                 <a:latin typeface="Courier New" panose="02070309020205020404" pitchFamily="49" charset="0"/>
                 <a:cs typeface="Courier New" panose="02070309020205020404" pitchFamily="49" charset="0"/>
               </a:rPr>
-              <a:t>catkin_make</a:t>
-            </a:r>
-          </a:p>
-          <a:p>
-            <a:r>
-              <a:rPr lang="en-US" dirty="0"/>
-              <a:t>Run the nodes:</a:t>
+              <a:t> src/simple_publisher.cpp)</a:t>
             </a:r>
           </a:p>
           <a:p>
             <a:pPr lvl="1"/>
-            <a:r>
-              <a:rPr lang="en-US" dirty="0"/>
-              <a:t>$ </a:t>
-            </a:r>
             <a:r>
               <a:rPr lang="en-US" dirty="0">
                 <a:latin typeface="Courier New" panose="02070309020205020404" pitchFamily="49" charset="0"/>
                 <a:cs typeface="Courier New" panose="02070309020205020404" pitchFamily="49" charset="0"/>
               </a:rPr>
-              <a:t>roscore</a:t>
-            </a:r>
-          </a:p>
-          <a:p>
-            <a:pPr lvl="1"/>
-            <a:r>
-              <a:rPr lang="en-US" dirty="0"/>
-              <a:t>(in a different terminal) $ </a:t>
+              <a:t>target_link_libraries(simple_publisher ${</a:t>
+            </a:r>
+            <a:r>
+              <a:rPr lang="en-US" dirty="0" err="1">
+                <a:latin typeface="Courier New" panose="02070309020205020404" pitchFamily="49" charset="0"/>
+                <a:cs typeface="Courier New" panose="02070309020205020404" pitchFamily="49" charset="0"/>
+              </a:rPr>
+              <a:t>catkin_LIBRARIES</a:t>
             </a:r>
             <a:r>
               <a:rPr lang="en-US" dirty="0">
                 <a:latin typeface="Courier New" panose="02070309020205020404" pitchFamily="49" charset="0"/>
                 <a:cs typeface="Courier New" panose="02070309020205020404" pitchFamily="49" charset="0"/>
               </a:rPr>
-              <a:t>rosrun simple_pub_sub simple_publisher</a:t>
+              <a:t>})</a:t>
             </a:r>
           </a:p>
           <a:p>
             <a:pPr lvl="1"/>
-            <a:r>
-              <a:rPr lang="en-US" dirty="0"/>
-              <a:t>(in a different terminal) $ </a:t>
-            </a:r>
             <a:r>
               <a:rPr lang="en-US" dirty="0">
                 <a:latin typeface="Courier New" panose="02070309020205020404" pitchFamily="49" charset="0"/>
                 <a:cs typeface="Courier New" panose="02070309020205020404" pitchFamily="49" charset="0"/>
               </a:rPr>
-              <a:t>rosrun simple_pub_sub simple_subscriber</a:t>
-            </a:r>
-          </a:p>
-          <a:p>
-            <a:endParaRPr lang="en-US" dirty="0"/>
+              <a:t>add_dependencies(simple_publisher ${PROJECT_NAME}_</a:t>
+            </a:r>
+            <a:r>
+              <a:rPr lang="en-US" dirty="0" err="1">
+                <a:latin typeface="Courier New" panose="02070309020205020404" pitchFamily="49" charset="0"/>
+                <a:cs typeface="Courier New" panose="02070309020205020404" pitchFamily="49" charset="0"/>
+              </a:rPr>
+              <a:t>generate_message_cpp</a:t>
+            </a:r>
+            <a:r>
+              <a:rPr lang="en-US" dirty="0">
+                <a:latin typeface="Courier New" panose="02070309020205020404" pitchFamily="49" charset="0"/>
+                <a:cs typeface="Courier New" panose="02070309020205020404" pitchFamily="49" charset="0"/>
+              </a:rPr>
+              <a:t>)</a:t>
+            </a:r>
+          </a:p>
+          <a:p>
+            <a:r>
+              <a:rPr lang="en-US" dirty="0">
+                <a:cs typeface="Courier New" panose="02070309020205020404" pitchFamily="49" charset="0"/>
+              </a:rPr>
+              <a:t>Do the same thing for every node added to the package</a:t>
+            </a:r>
           </a:p>
         </p:txBody>
       </p:sp>
     </p:spTree>
     <p:extLst>
       <p:ext uri="{BB962C8B-B14F-4D97-AF65-F5344CB8AC3E}">
-        <p14:creationId xmlns:p14="http://schemas.microsoft.com/office/powerpoint/2010/main" val="2919917682"/>
+        <p14:creationId xmlns:p14="http://schemas.microsoft.com/office/powerpoint/2010/main" val="4206895970"/>
       </p:ext>
     </p:extLst>
   </p:cSld>
@@ -5581,16 +5792,6 @@
 <file path=ppt/slides/slide8.xml><?xml version="1.0" encoding="utf-8"?>
 <p:sld xmlns:a="http://schemas.openxmlformats.org/drawingml/2006/main" xmlns:r="http://schemas.openxmlformats.org/officeDocument/2006/relationships" xmlns:p="http://schemas.openxmlformats.org/presentationml/2006/main">
   <p:cSld>
-    <p:bg>
-      <p:bgPr>
-        <a:solidFill>
-          <a:schemeClr val="bg1">
-            <a:lumMod val="95000"/>
-          </a:schemeClr>
-        </a:solidFill>
-        <a:effectLst/>
-      </p:bgPr>
-    </p:bg>
     <p:spTree>
       <p:nvGrpSpPr>
         <p:cNvPr id="1" name=""/>
@@ -5610,7 +5811,7 @@
           <p:cNvPr id="2" name="Title 1">
             <a:extLst>
               <a:ext uri="{FF2B5EF4-FFF2-40B4-BE49-F238E27FC236}">
-                <a16:creationId xmlns:a16="http://schemas.microsoft.com/office/drawing/2014/main" id="{3AA4BCF3-9D4F-4EB8-A66F-B98FEC2E0CA8}"/>
+                <a16:creationId xmlns:a16="http://schemas.microsoft.com/office/drawing/2014/main" id="{0D8ED408-33D1-4390-B266-9B01B97B73D9}"/>
               </a:ext>
             </a:extLst>
           </p:cNvPr>
@@ -5621,28 +5822,14 @@
             <p:ph type="title"/>
           </p:nvPr>
         </p:nvSpPr>
-        <p:spPr>
-          <a:xfrm>
-            <a:off x="2231136" y="964692"/>
-            <a:ext cx="7729728" cy="1188720"/>
-          </a:xfrm>
-        </p:spPr>
-        <p:txBody>
-          <a:bodyPr>
-            <a:normAutofit/>
-          </a:bodyPr>
-          <a:lstStyle/>
-          <a:p>
-            <a:r>
-              <a:rPr lang="en-US" dirty="0"/>
-              <a:t>Working with ros topics </a:t>
-            </a:r>
-            <a:br>
-              <a:rPr lang="en-US" dirty="0"/>
-            </a:br>
-            <a:r>
-              <a:rPr lang="en-US" dirty="0"/>
-              <a:t>(custom messages)</a:t>
+        <p:spPr/>
+        <p:txBody>
+          <a:bodyPr/>
+          <a:lstStyle/>
+          <a:p>
+            <a:r>
+              <a:rPr lang="en-US" dirty="0"/>
+              <a:t>Build and run</a:t>
             </a:r>
           </a:p>
         </p:txBody>
@@ -5652,7 +5839,7 @@
           <p:cNvPr id="3" name="Content Placeholder 2">
             <a:extLst>
               <a:ext uri="{FF2B5EF4-FFF2-40B4-BE49-F238E27FC236}">
-                <a16:creationId xmlns:a16="http://schemas.microsoft.com/office/drawing/2014/main" id="{F3B9B54E-62A3-43B9-BF83-6410F857E6CA}"/>
+                <a16:creationId xmlns:a16="http://schemas.microsoft.com/office/drawing/2014/main" id="{AEDB433D-A6FD-4430-B437-024500F92F6D}"/>
               </a:ext>
             </a:extLst>
           </p:cNvPr>
@@ -5663,232 +5850,109 @@
             <p:ph idx="1"/>
           </p:nvPr>
         </p:nvSpPr>
-        <p:spPr>
-          <a:xfrm>
-            <a:off x="2221992" y="2638044"/>
-            <a:ext cx="4828030" cy="3101983"/>
-          </a:xfrm>
-        </p:spPr>
+        <p:spPr/>
         <p:txBody>
           <a:bodyPr>
-            <a:normAutofit/>
+            <a:normAutofit fontScale="92500" lnSpcReduction="10000"/>
           </a:bodyPr>
           <a:lstStyle/>
           <a:p>
-            <a:pPr>
-              <a:lnSpc>
-                <a:spcPct val="90000"/>
-              </a:lnSpc>
-            </a:pPr>
-            <a:r>
-              <a:rPr lang="en-US" dirty="0"/>
-              <a:t>Sending a custom message is just like sending a standard ROS message</a:t>
-            </a:r>
-          </a:p>
-          <a:p>
-            <a:pPr>
-              <a:lnSpc>
-                <a:spcPct val="90000"/>
-              </a:lnSpc>
-            </a:pPr>
-            <a:r>
-              <a:rPr lang="en-US" dirty="0"/>
-              <a:t>The only difference is that we are treating the .msg file as if it is a struct with each member being the fields declared inside it</a:t>
-            </a:r>
-          </a:p>
-          <a:p>
-            <a:pPr>
-              <a:lnSpc>
-                <a:spcPct val="90000"/>
-              </a:lnSpc>
-            </a:pPr>
-            <a:r>
-              <a:rPr lang="en-US" dirty="0"/>
-              <a:t>Example: sending the message ID.msg with the content:</a:t>
-            </a:r>
-          </a:p>
-          <a:p>
-            <a:pPr lvl="1">
-              <a:lnSpc>
-                <a:spcPct val="90000"/>
-              </a:lnSpc>
-            </a:pPr>
-            <a:r>
-              <a:rPr lang="en-US" dirty="0"/>
-              <a:t>In our program, we can treat a variable ‘msg’ of type &lt;simple_pub_sub::ID&gt; to have 3 fields: </a:t>
-            </a:r>
-            <a:r>
-              <a:rPr lang="en-US" dirty="0" err="1"/>
-              <a:t>msg.age</a:t>
-            </a:r>
-            <a:r>
-              <a:rPr lang="en-US" dirty="0"/>
-              <a:t>, msg.firstName and msg.lastName.</a:t>
-            </a:r>
-          </a:p>
-        </p:txBody>
-      </p:sp>
-      <p:sp>
-        <p:nvSpPr>
-          <p:cNvPr id="14" name="Rectangle 9">
-            <a:extLst>
-              <a:ext uri="{FF2B5EF4-FFF2-40B4-BE49-F238E27FC236}">
-                <a16:creationId xmlns:a16="http://schemas.microsoft.com/office/drawing/2014/main" id="{7CA2418C-C307-4704-B727-FB9D2BBA1146}"/>
-              </a:ext>
-              <a:ext uri="{C183D7F6-B498-43B3-948B-1728B52AA6E4}">
-                <adec:decorative xmlns:adec="http://schemas.microsoft.com/office/drawing/2017/decorative" val="1"/>
-              </a:ext>
-            </a:extLst>
-          </p:cNvPr>
-          <p:cNvSpPr>
-            <a:spLocks noGrp="1" noRot="1" noChangeAspect="1" noMove="1" noResize="1" noEditPoints="1" noAdjustHandles="1" noChangeArrowheads="1" noChangeShapeType="1" noTextEdit="1"/>
-          </p:cNvSpPr>
-          <p:nvPr>
-            <p:extLst>
-              <p:ext uri="{386F3935-93C4-4BCD-93E2-E3B085C9AB24}">
-                <p16:designElem xmlns:p16="http://schemas.microsoft.com/office/powerpoint/2015/main" val="1"/>
-              </p:ext>
-            </p:extLst>
-          </p:nvPr>
-        </p:nvSpPr>
-        <p:spPr>
-          <a:xfrm>
-            <a:off x="7515406" y="2743200"/>
-            <a:ext cx="2445458" cy="2996827"/>
-          </a:xfrm>
-          <a:prstGeom prst="rect">
-            <a:avLst/>
-          </a:prstGeom>
-          <a:noFill/>
-          <a:ln w="31750" cap="sq">
-            <a:solidFill>
-              <a:srgbClr val="FFFFFF"/>
-            </a:solidFill>
-            <a:miter lim="800000"/>
-          </a:ln>
-        </p:spPr>
-        <p:style>
-          <a:lnRef idx="2">
-            <a:schemeClr val="accent1">
-              <a:shade val="50000"/>
-            </a:schemeClr>
-          </a:lnRef>
-          <a:fillRef idx="1">
-            <a:schemeClr val="accent1"/>
-          </a:fillRef>
-          <a:effectRef idx="0">
-            <a:schemeClr val="accent1"/>
-          </a:effectRef>
-          <a:fontRef idx="minor">
-            <a:schemeClr val="lt1"/>
-          </a:fontRef>
-        </p:style>
-        <p:txBody>
-          <a:bodyPr rtlCol="0" anchor="ctr"/>
-          <a:lstStyle/>
-          <a:p>
-            <a:pPr algn="ctr"/>
-            <a:endParaRPr lang="en-US" dirty="0"/>
-          </a:p>
-        </p:txBody>
-      </p:sp>
-      <p:sp>
-        <p:nvSpPr>
-          <p:cNvPr id="15" name="Rectangle 11">
-            <a:extLst>
-              <a:ext uri="{FF2B5EF4-FFF2-40B4-BE49-F238E27FC236}">
-                <a16:creationId xmlns:a16="http://schemas.microsoft.com/office/drawing/2014/main" id="{2A20F136-B1A5-4878-B85C-B805425D94FA}"/>
-              </a:ext>
-              <a:ext uri="{C183D7F6-B498-43B3-948B-1728B52AA6E4}">
-                <adec:decorative xmlns:adec="http://schemas.microsoft.com/office/drawing/2017/decorative" val="1"/>
-              </a:ext>
-            </a:extLst>
-          </p:cNvPr>
-          <p:cNvSpPr>
-            <a:spLocks noGrp="1" noRot="1" noChangeAspect="1" noMove="1" noResize="1" noEditPoints="1" noAdjustHandles="1" noChangeArrowheads="1" noChangeShapeType="1" noTextEdit="1"/>
-          </p:cNvSpPr>
-          <p:nvPr>
-            <p:extLst>
-              <p:ext uri="{386F3935-93C4-4BCD-93E2-E3B085C9AB24}">
-                <p16:designElem xmlns:p16="http://schemas.microsoft.com/office/powerpoint/2015/main" val="1"/>
-              </p:ext>
-            </p:extLst>
-          </p:nvPr>
-        </p:nvSpPr>
-        <p:spPr>
-          <a:xfrm>
-            <a:off x="7682003" y="2906589"/>
-            <a:ext cx="2112264" cy="2670048"/>
-          </a:xfrm>
-          <a:prstGeom prst="rect">
-            <a:avLst/>
-          </a:prstGeom>
-          <a:solidFill>
-            <a:srgbClr val="FFFFFF"/>
-          </a:solidFill>
-          <a:ln>
-            <a:noFill/>
-          </a:ln>
-        </p:spPr>
-        <p:style>
-          <a:lnRef idx="2">
-            <a:schemeClr val="accent1">
-              <a:shade val="50000"/>
-            </a:schemeClr>
-          </a:lnRef>
-          <a:fillRef idx="1">
-            <a:schemeClr val="accent1"/>
-          </a:fillRef>
-          <a:effectRef idx="0">
-            <a:schemeClr val="accent1"/>
-          </a:effectRef>
-          <a:fontRef idx="minor">
-            <a:schemeClr val="lt1"/>
-          </a:fontRef>
-        </p:style>
-        <p:txBody>
-          <a:bodyPr rtlCol="0" anchor="ctr"/>
-          <a:lstStyle/>
-          <a:p>
-            <a:pPr algn="ctr"/>
-            <a:endParaRPr lang="en-US"/>
-          </a:p>
-        </p:txBody>
-      </p:sp>
-      <p:pic>
-        <p:nvPicPr>
-          <p:cNvPr id="6" name="Picture 5">
-            <a:extLst>
-              <a:ext uri="{FF2B5EF4-FFF2-40B4-BE49-F238E27FC236}">
-                <a16:creationId xmlns:a16="http://schemas.microsoft.com/office/drawing/2014/main" id="{265FCA5E-277E-494C-8C27-71F3C53A48B4}"/>
-              </a:ext>
-            </a:extLst>
-          </p:cNvPr>
-          <p:cNvPicPr>
-            <a:picLocks noChangeAspect="1"/>
-          </p:cNvPicPr>
-          <p:nvPr/>
-        </p:nvPicPr>
-        <p:blipFill>
-          <a:blip r:embed="rId2"/>
-          <a:stretch>
-            <a:fillRect/>
-          </a:stretch>
-        </p:blipFill>
-        <p:spPr>
-          <a:xfrm>
-            <a:off x="7804801" y="3853542"/>
-            <a:ext cx="1989465" cy="827199"/>
-          </a:xfrm>
-          <a:prstGeom prst="rect">
-            <a:avLst/>
-          </a:prstGeom>
-        </p:spPr>
-      </p:pic>
+            <a:r>
+              <a:rPr lang="en-US" dirty="0"/>
+              <a:t>After having finished all the modifications to the CMakeList.txt, all that’s left is to build and test the nodes.</a:t>
+            </a:r>
+          </a:p>
+          <a:p>
+            <a:r>
+              <a:rPr lang="en-US" dirty="0"/>
+              <a:t>Build the package with: </a:t>
+            </a:r>
+          </a:p>
+          <a:p>
+            <a:pPr lvl="1"/>
+            <a:r>
+              <a:rPr lang="en-US" dirty="0"/>
+              <a:t>$ </a:t>
+            </a:r>
+            <a:r>
+              <a:rPr lang="en-US" dirty="0">
+                <a:latin typeface="Courier New" panose="02070309020205020404" pitchFamily="49" charset="0"/>
+                <a:cs typeface="Courier New" panose="02070309020205020404" pitchFamily="49" charset="0"/>
+              </a:rPr>
+              <a:t>cd ~/catkin_ws</a:t>
+            </a:r>
+          </a:p>
+          <a:p>
+            <a:pPr lvl="1"/>
+            <a:r>
+              <a:rPr lang="en-US" dirty="0"/>
+              <a:t>$ </a:t>
+            </a:r>
+            <a:r>
+              <a:rPr lang="en-US" dirty="0">
+                <a:latin typeface="Courier New" panose="02070309020205020404" pitchFamily="49" charset="0"/>
+                <a:cs typeface="Courier New" panose="02070309020205020404" pitchFamily="49" charset="0"/>
+              </a:rPr>
+              <a:t>catkin_make</a:t>
+            </a:r>
+          </a:p>
+          <a:p>
+            <a:r>
+              <a:rPr lang="en-US" dirty="0"/>
+              <a:t>Run the nodes:</a:t>
+            </a:r>
+          </a:p>
+          <a:p>
+            <a:pPr lvl="1"/>
+            <a:r>
+              <a:rPr lang="en-US" dirty="0"/>
+              <a:t>$ </a:t>
+            </a:r>
+            <a:r>
+              <a:rPr lang="en-US" dirty="0">
+                <a:latin typeface="Courier New" panose="02070309020205020404" pitchFamily="49" charset="0"/>
+                <a:cs typeface="Courier New" panose="02070309020205020404" pitchFamily="49" charset="0"/>
+              </a:rPr>
+              <a:t>roscore</a:t>
+            </a:r>
+          </a:p>
+          <a:p>
+            <a:pPr lvl="1"/>
+            <a:r>
+              <a:rPr lang="en-US" dirty="0"/>
+              <a:t>(in a different terminal) $ </a:t>
+            </a:r>
+            <a:r>
+              <a:rPr lang="en-US" dirty="0">
+                <a:latin typeface="Courier New" panose="02070309020205020404" pitchFamily="49" charset="0"/>
+                <a:cs typeface="Courier New" panose="02070309020205020404" pitchFamily="49" charset="0"/>
+              </a:rPr>
+              <a:t>rosrun simple_pub_sub simple_publisher</a:t>
+            </a:r>
+          </a:p>
+          <a:p>
+            <a:pPr lvl="1"/>
+            <a:r>
+              <a:rPr lang="en-US" dirty="0"/>
+              <a:t>(in a different terminal) $ </a:t>
+            </a:r>
+            <a:r>
+              <a:rPr lang="en-US" dirty="0">
+                <a:latin typeface="Courier New" panose="02070309020205020404" pitchFamily="49" charset="0"/>
+                <a:cs typeface="Courier New" panose="02070309020205020404" pitchFamily="49" charset="0"/>
+              </a:rPr>
+              <a:t>rosrun simple_pub_sub simple_subscriber</a:t>
+            </a:r>
+          </a:p>
+          <a:p>
+            <a:endParaRPr lang="en-US" dirty="0"/>
+          </a:p>
+        </p:txBody>
+      </p:sp>
     </p:spTree>
     <p:extLst>
       <p:ext uri="{BB962C8B-B14F-4D97-AF65-F5344CB8AC3E}">
-        <p14:creationId xmlns:p14="http://schemas.microsoft.com/office/powerpoint/2010/main" val="1835445461"/>
+        <p14:creationId xmlns:p14="http://schemas.microsoft.com/office/powerpoint/2010/main" val="2919917682"/>
       </p:ext>
     </p:extLst>
   </p:cSld>
@@ -5930,7 +5994,7 @@
           <p:cNvPr id="2" name="Title 1">
             <a:extLst>
               <a:ext uri="{FF2B5EF4-FFF2-40B4-BE49-F238E27FC236}">
-                <a16:creationId xmlns:a16="http://schemas.microsoft.com/office/drawing/2014/main" id="{C741F90C-425C-4B81-93EF-3264BC7BFDF1}"/>
+                <a16:creationId xmlns:a16="http://schemas.microsoft.com/office/drawing/2014/main" id="{3AA4BCF3-9D4F-4EB8-A66F-B98FEC2E0CA8}"/>
               </a:ext>
             </a:extLst>
           </p:cNvPr>
@@ -5943,8 +6007,8 @@
         </p:nvSpPr>
         <p:spPr>
           <a:xfrm>
-            <a:off x="804672" y="964692"/>
-            <a:ext cx="3066937" cy="1188720"/>
+            <a:off x="2231136" y="964692"/>
+            <a:ext cx="7729728" cy="1188720"/>
           </a:xfrm>
         </p:spPr>
         <p:txBody>
@@ -5954,14 +6018,14 @@
           <a:lstStyle/>
           <a:p>
             <a:r>
-              <a:rPr lang="en-US" sz="1800"/>
+              <a:rPr lang="en-US" dirty="0"/>
               <a:t>Working with ros topics </a:t>
             </a:r>
             <a:br>
-              <a:rPr lang="en-US" sz="1800"/>
+              <a:rPr lang="en-US" dirty="0"/>
             </a:br>
             <a:r>
-              <a:rPr lang="en-US" sz="1800"/>
+              <a:rPr lang="en-US" dirty="0"/>
               <a:t>(custom messages)</a:t>
             </a:r>
           </a:p>
@@ -5972,7 +6036,7 @@
           <p:cNvPr id="3" name="Content Placeholder 2">
             <a:extLst>
               <a:ext uri="{FF2B5EF4-FFF2-40B4-BE49-F238E27FC236}">
-                <a16:creationId xmlns:a16="http://schemas.microsoft.com/office/drawing/2014/main" id="{FEB8B432-26DB-44FA-978B-060CAFC3CF7E}"/>
+                <a16:creationId xmlns:a16="http://schemas.microsoft.com/office/drawing/2014/main" id="{F3B9B54E-62A3-43B9-BF83-6410F857E6CA}"/>
               </a:ext>
             </a:extLst>
           </p:cNvPr>
@@ -5985,8 +6049,8 @@
         </p:nvSpPr>
         <p:spPr>
           <a:xfrm>
-            <a:off x="803244" y="2638044"/>
-            <a:ext cx="3063765" cy="3263206"/>
+            <a:off x="2221992" y="2638044"/>
+            <a:ext cx="4828030" cy="3101983"/>
           </a:xfrm>
         </p:spPr>
         <p:txBody>
@@ -5995,39 +6059,65 @@
           </a:bodyPr>
           <a:lstStyle/>
           <a:p>
-            <a:r>
-              <a:rPr lang="en-US" dirty="0"/>
-              <a:t>Here we have an example of a custom publisher</a:t>
-            </a:r>
-          </a:p>
-          <a:p>
-            <a:r>
-              <a:rPr lang="en-US" dirty="0"/>
-              <a:t>The key differences are: </a:t>
-            </a:r>
-          </a:p>
-          <a:p>
-            <a:pPr lvl="1"/>
-            <a:r>
-              <a:rPr lang="en-US" dirty="0"/>
-              <a:t>We include the .msg file as a header to use the message</a:t>
-            </a:r>
-          </a:p>
-          <a:p>
-            <a:pPr lvl="1"/>
-            <a:r>
-              <a:rPr lang="en-US" dirty="0"/>
-              <a:t>The message file name is treated as if it was a struct</a:t>
-            </a:r>
-          </a:p>
-        </p:txBody>
-      </p:sp>
-      <p:sp>
-        <p:nvSpPr>
-          <p:cNvPr id="9" name="Rectangle 8">
+            <a:pPr>
+              <a:lnSpc>
+                <a:spcPct val="90000"/>
+              </a:lnSpc>
+            </a:pPr>
+            <a:r>
+              <a:rPr lang="en-US" dirty="0"/>
+              <a:t>Sending a custom message is just like sending a standard ROS message</a:t>
+            </a:r>
+          </a:p>
+          <a:p>
+            <a:pPr>
+              <a:lnSpc>
+                <a:spcPct val="90000"/>
+              </a:lnSpc>
+            </a:pPr>
+            <a:r>
+              <a:rPr lang="en-US" dirty="0"/>
+              <a:t>The only difference is that we are treating the .msg file as if it is a struct with each member being the fields declared inside it</a:t>
+            </a:r>
+          </a:p>
+          <a:p>
+            <a:pPr>
+              <a:lnSpc>
+                <a:spcPct val="90000"/>
+              </a:lnSpc>
+            </a:pPr>
+            <a:r>
+              <a:rPr lang="en-US" dirty="0"/>
+              <a:t>Example: sending the message ID.msg with the content:</a:t>
+            </a:r>
+          </a:p>
+          <a:p>
+            <a:pPr lvl="1">
+              <a:lnSpc>
+                <a:spcPct val="90000"/>
+              </a:lnSpc>
+            </a:pPr>
+            <a:r>
+              <a:rPr lang="en-US" dirty="0"/>
+              <a:t>In our program, we can treat a variable ‘msg’ of type &lt;simple_pub_sub::ID&gt; to have 3 fields: </a:t>
+            </a:r>
+            <a:r>
+              <a:rPr lang="en-US" dirty="0" err="1"/>
+              <a:t>msg.age</a:t>
+            </a:r>
+            <a:r>
+              <a:rPr lang="en-US" dirty="0"/>
+              <a:t>, msg.firstName and msg.lastName.</a:t>
+            </a:r>
+          </a:p>
+        </p:txBody>
+      </p:sp>
+      <p:sp>
+        <p:nvSpPr>
+          <p:cNvPr id="14" name="Rectangle 9">
             <a:extLst>
               <a:ext uri="{FF2B5EF4-FFF2-40B4-BE49-F238E27FC236}">
-                <a16:creationId xmlns:a16="http://schemas.microsoft.com/office/drawing/2014/main" id="{6515FC82-3453-4CBE-8895-4CCFF339529E}"/>
+                <a16:creationId xmlns:a16="http://schemas.microsoft.com/office/drawing/2014/main" id="{7CA2418C-C307-4704-B727-FB9D2BBA1146}"/>
               </a:ext>
               <a:ext uri="{C183D7F6-B498-43B3-948B-1728B52AA6E4}">
                 <adec:decorative xmlns:adec="http://schemas.microsoft.com/office/drawing/2017/decorative" val="1"/>
@@ -6047,8 +6137,8 @@
         </p:nvSpPr>
         <p:spPr>
           <a:xfrm>
-            <a:off x="4494182" y="964692"/>
-            <a:ext cx="6885432" cy="4936558"/>
+            <a:off x="7515406" y="2743200"/>
+            <a:ext cx="2445458" cy="2996827"/>
           </a:xfrm>
           <a:prstGeom prst="rect">
             <a:avLst/>
@@ -6088,10 +6178,10 @@
       </p:sp>
       <p:sp>
         <p:nvSpPr>
-          <p:cNvPr id="11" name="Rectangle 10">
+          <p:cNvPr id="15" name="Rectangle 11">
             <a:extLst>
               <a:ext uri="{FF2B5EF4-FFF2-40B4-BE49-F238E27FC236}">
-                <a16:creationId xmlns:a16="http://schemas.microsoft.com/office/drawing/2014/main" id="{C5FD847B-65C0-4027-8DFC-70CB424514F8}"/>
+                <a16:creationId xmlns:a16="http://schemas.microsoft.com/office/drawing/2014/main" id="{2A20F136-B1A5-4878-B85C-B805425D94FA}"/>
               </a:ext>
               <a:ext uri="{C183D7F6-B498-43B3-948B-1728B52AA6E4}">
                 <adec:decorative xmlns:adec="http://schemas.microsoft.com/office/drawing/2017/decorative" val="1"/>
@@ -6111,8 +6201,8 @@
         </p:nvSpPr>
         <p:spPr>
           <a:xfrm>
-            <a:off x="4657802" y="1128683"/>
-            <a:ext cx="6558192" cy="4608576"/>
+            <a:off x="7682003" y="2906589"/>
+            <a:ext cx="2112264" cy="2670048"/>
           </a:xfrm>
           <a:prstGeom prst="rect">
             <a:avLst/>
@@ -6151,10 +6241,10 @@
       </p:sp>
       <p:pic>
         <p:nvPicPr>
-          <p:cNvPr id="4" name="Picture 3">
+          <p:cNvPr id="6" name="Picture 5">
             <a:extLst>
               <a:ext uri="{FF2B5EF4-FFF2-40B4-BE49-F238E27FC236}">
-                <a16:creationId xmlns:a16="http://schemas.microsoft.com/office/drawing/2014/main" id="{8F1CAA98-B9E5-4455-856C-E356E9A7D80C}"/>
+                <a16:creationId xmlns:a16="http://schemas.microsoft.com/office/drawing/2014/main" id="{265FCA5E-277E-494C-8C27-71F3C53A48B4}"/>
               </a:ext>
             </a:extLst>
           </p:cNvPr>
@@ -6171,8 +6261,8 @@
         </p:blipFill>
         <p:spPr>
           <a:xfrm>
-            <a:off x="4823366" y="1525932"/>
-            <a:ext cx="6227064" cy="3814077"/>
+            <a:off x="7804801" y="3853542"/>
+            <a:ext cx="1989465" cy="827199"/>
           </a:xfrm>
           <a:prstGeom prst="rect">
             <a:avLst/>
@@ -6182,7 +6272,7 @@
     </p:spTree>
     <p:extLst>
       <p:ext uri="{BB962C8B-B14F-4D97-AF65-F5344CB8AC3E}">
-        <p14:creationId xmlns:p14="http://schemas.microsoft.com/office/powerpoint/2010/main" val="801102462"/>
+        <p14:creationId xmlns:p14="http://schemas.microsoft.com/office/powerpoint/2010/main" val="1835445461"/>
       </p:ext>
     </p:extLst>
   </p:cSld>

</xml_diff>